<commit_message>
Relecture et question rapports
</commit_message>
<xml_diff>
--- a/notes_de_stage.pptx
+++ b/notes_de_stage.pptx
@@ -148,16 +148,32 @@
 </p:presentation>
 </file>
 
-<file path=ppt/revisionInfo.xml><?xml version="1.0" encoding="utf-8"?>
-<p1510:revInfo xmlns:a="http://schemas.openxmlformats.org/drawingml/2006/main" xmlns:r="http://schemas.openxmlformats.org/officeDocument/2006/relationships" xmlns:p1510="http://schemas.microsoft.com/office/powerpoint/2015/10/main">
-  <p1510:revLst>
-    <p1510:client id="{01E73667-2BEF-4007-AD34-DC26F6381063}" v="356" dt="2023-12-13T22:54:45.400"/>
-  </p1510:revLst>
-</p1510:revInfo>
-</file>
-
 <file path=ppt/changesInfos/changesInfo1.xml><?xml version="1.0" encoding="utf-8"?>
 <pc:chgInfo xmlns:a="http://schemas.openxmlformats.org/drawingml/2006/main" xmlns:r="http://schemas.openxmlformats.org/officeDocument/2006/relationships" xmlns:ac="http://schemas.microsoft.com/office/drawing/2013/main/command" xmlns:pc="http://schemas.microsoft.com/office/powerpoint/2013/main/command">
+  <pc:docChgLst>
+    <pc:chgData name="Philippe Baucour" userId="5102170ae7533958" providerId="LiveId" clId="{88E6E61E-B8CC-C346-93B9-E173F097E440}"/>
+    <pc:docChg chg="modSld">
+      <pc:chgData name="Philippe Baucour" userId="5102170ae7533958" providerId="LiveId" clId="{88E6E61E-B8CC-C346-93B9-E173F097E440}" dt="2023-12-15T00:52:44.705" v="10" actId="20577"/>
+      <pc:docMkLst>
+        <pc:docMk/>
+      </pc:docMkLst>
+      <pc:sldChg chg="modSp">
+        <pc:chgData name="Philippe Baucour" userId="5102170ae7533958" providerId="LiveId" clId="{88E6E61E-B8CC-C346-93B9-E173F097E440}" dt="2023-12-15T00:52:44.705" v="10" actId="20577"/>
+        <pc:sldMkLst>
+          <pc:docMk/>
+          <pc:sldMk cId="4079956193" sldId="286"/>
+        </pc:sldMkLst>
+        <pc:spChg chg="mod">
+          <ac:chgData name="Philippe Baucour" userId="5102170ae7533958" providerId="LiveId" clId="{88E6E61E-B8CC-C346-93B9-E173F097E440}" dt="2023-12-15T00:52:44.705" v="10" actId="20577"/>
+          <ac:spMkLst>
+            <pc:docMk/>
+            <pc:sldMk cId="4079956193" sldId="286"/>
+            <ac:spMk id="3" creationId="{50F452AD-BB6D-A971-A6ED-43CD09F7AB2B}"/>
+          </ac:spMkLst>
+        </pc:spChg>
+      </pc:sldChg>
+    </pc:docChg>
+  </pc:docChgLst>
   <pc:docChgLst>
     <pc:chgData name="Philippe Baucour" userId="5102170ae7533958" providerId="LiveId" clId="{01E73667-2BEF-4007-AD34-DC26F6381063}"/>
     <pc:docChg chg="undo custSel addSld delSld modSld sldOrd">
@@ -1845,7 +1861,7 @@
           <a:p>
             <a:fld id="{4471ECC3-BD70-4F1E-B981-43613CDB8BB8}" type="datetimeFigureOut">
               <a:rPr lang="fr-FR" smtClean="0"/>
-              <a:t>13/12/2023</a:t>
+              <a:t>15/12/2023</a:t>
             </a:fld>
             <a:endParaRPr lang="fr-FR"/>
           </a:p>
@@ -2417,7 +2433,7 @@
           <a:p>
             <a:fld id="{814EAAF8-3877-4B4B-B2A5-D637106D66A3}" type="datetimeFigureOut">
               <a:rPr lang="fr-FR" smtClean="0"/>
-              <a:t>13/12/2023</a:t>
+              <a:t>15/12/2023</a:t>
             </a:fld>
             <a:endParaRPr lang="fr-FR"/>
           </a:p>
@@ -2615,7 +2631,7 @@
           <a:p>
             <a:fld id="{814EAAF8-3877-4B4B-B2A5-D637106D66A3}" type="datetimeFigureOut">
               <a:rPr lang="fr-FR" smtClean="0"/>
-              <a:t>13/12/2023</a:t>
+              <a:t>15/12/2023</a:t>
             </a:fld>
             <a:endParaRPr lang="fr-FR"/>
           </a:p>
@@ -2823,7 +2839,7 @@
           <a:p>
             <a:fld id="{814EAAF8-3877-4B4B-B2A5-D637106D66A3}" type="datetimeFigureOut">
               <a:rPr lang="fr-FR" smtClean="0"/>
-              <a:t>13/12/2023</a:t>
+              <a:t>15/12/2023</a:t>
             </a:fld>
             <a:endParaRPr lang="fr-FR"/>
           </a:p>
@@ -3021,7 +3037,7 @@
           <a:p>
             <a:fld id="{814EAAF8-3877-4B4B-B2A5-D637106D66A3}" type="datetimeFigureOut">
               <a:rPr lang="fr-FR" smtClean="0"/>
-              <a:t>13/12/2023</a:t>
+              <a:t>15/12/2023</a:t>
             </a:fld>
             <a:endParaRPr lang="fr-FR"/>
           </a:p>
@@ -3296,7 +3312,7 @@
           <a:p>
             <a:fld id="{814EAAF8-3877-4B4B-B2A5-D637106D66A3}" type="datetimeFigureOut">
               <a:rPr lang="fr-FR" smtClean="0"/>
-              <a:t>13/12/2023</a:t>
+              <a:t>15/12/2023</a:t>
             </a:fld>
             <a:endParaRPr lang="fr-FR"/>
           </a:p>
@@ -3561,7 +3577,7 @@
           <a:p>
             <a:fld id="{814EAAF8-3877-4B4B-B2A5-D637106D66A3}" type="datetimeFigureOut">
               <a:rPr lang="fr-FR" smtClean="0"/>
-              <a:t>13/12/2023</a:t>
+              <a:t>15/12/2023</a:t>
             </a:fld>
             <a:endParaRPr lang="fr-FR"/>
           </a:p>
@@ -3973,7 +3989,7 @@
           <a:p>
             <a:fld id="{814EAAF8-3877-4B4B-B2A5-D637106D66A3}" type="datetimeFigureOut">
               <a:rPr lang="fr-FR" smtClean="0"/>
-              <a:t>13/12/2023</a:t>
+              <a:t>15/12/2023</a:t>
             </a:fld>
             <a:endParaRPr lang="fr-FR"/>
           </a:p>
@@ -4114,7 +4130,7 @@
           <a:p>
             <a:fld id="{814EAAF8-3877-4B4B-B2A5-D637106D66A3}" type="datetimeFigureOut">
               <a:rPr lang="fr-FR" smtClean="0"/>
-              <a:t>13/12/2023</a:t>
+              <a:t>15/12/2023</a:t>
             </a:fld>
             <a:endParaRPr lang="fr-FR"/>
           </a:p>
@@ -4227,7 +4243,7 @@
           <a:p>
             <a:fld id="{814EAAF8-3877-4B4B-B2A5-D637106D66A3}" type="datetimeFigureOut">
               <a:rPr lang="fr-FR" smtClean="0"/>
-              <a:t>13/12/2023</a:t>
+              <a:t>15/12/2023</a:t>
             </a:fld>
             <a:endParaRPr lang="fr-FR"/>
           </a:p>
@@ -4538,7 +4554,7 @@
           <a:p>
             <a:fld id="{814EAAF8-3877-4B4B-B2A5-D637106D66A3}" type="datetimeFigureOut">
               <a:rPr lang="fr-FR" smtClean="0"/>
-              <a:t>13/12/2023</a:t>
+              <a:t>15/12/2023</a:t>
             </a:fld>
             <a:endParaRPr lang="fr-FR"/>
           </a:p>
@@ -4826,7 +4842,7 @@
           <a:p>
             <a:fld id="{814EAAF8-3877-4B4B-B2A5-D637106D66A3}" type="datetimeFigureOut">
               <a:rPr lang="fr-FR" smtClean="0"/>
-              <a:t>13/12/2023</a:t>
+              <a:t>15/12/2023</a:t>
             </a:fld>
             <a:endParaRPr lang="fr-FR"/>
           </a:p>
@@ -5067,7 +5083,7 @@
           <a:p>
             <a:fld id="{814EAAF8-3877-4B4B-B2A5-D637106D66A3}" type="datetimeFigureOut">
               <a:rPr lang="fr-FR" smtClean="0"/>
-              <a:t>13/12/2023</a:t>
+              <a:t>15/12/2023</a:t>
             </a:fld>
             <a:endParaRPr lang="fr-FR"/>
           </a:p>
@@ -11797,7 +11813,15 @@
             </a:r>
             <a:r>
               <a:rPr lang="en-US" dirty="0"/>
-              <a:t> le cancer. Spam. Left col </a:t>
+              <a:t> le cancer. Spam. </a:t>
+            </a:r>
+            <a:r>
+              <a:rPr lang="fr-FR" dirty="0"/>
+              <a:t>Right </a:t>
+            </a:r>
+            <a:r>
+              <a:rPr lang="en-US" dirty="0"/>
+              <a:t>col </a:t>
             </a:r>
           </a:p>
           <a:p>

</xml_diff>

<commit_message>
recall et precision. Je crois que c'est clair maintenant
</commit_message>
<xml_diff>
--- a/notes_de_stage.pptx
+++ b/notes_de_stage.pptx
@@ -5,7 +5,7 @@
     <p:sldMasterId id="2147483648" r:id="rId1"/>
   </p:sldMasterIdLst>
   <p:notesMasterIdLst>
-    <p:notesMasterId r:id="rId36"/>
+    <p:notesMasterId r:id="rId41"/>
   </p:notesMasterIdLst>
   <p:sldIdLst>
     <p:sldId id="256" r:id="rId2"/>
@@ -40,8 +40,13 @@
     <p:sldId id="286" r:id="rId31"/>
     <p:sldId id="287" r:id="rId32"/>
     <p:sldId id="283" r:id="rId33"/>
-    <p:sldId id="284" r:id="rId34"/>
-    <p:sldId id="285" r:id="rId35"/>
+    <p:sldId id="290" r:id="rId34"/>
+    <p:sldId id="294" r:id="rId35"/>
+    <p:sldId id="284" r:id="rId36"/>
+    <p:sldId id="292" r:id="rId37"/>
+    <p:sldId id="285" r:id="rId38"/>
+    <p:sldId id="291" r:id="rId39"/>
+    <p:sldId id="293" r:id="rId40"/>
   </p:sldIdLst>
   <p:sldSz cx="12192000" cy="6858000"/>
   <p:notesSz cx="6858000" cy="9144000"/>
@@ -148,6 +153,14 @@
 </p:presentation>
 </file>
 
+<file path=ppt/revisionInfo.xml><?xml version="1.0" encoding="utf-8"?>
+<p1510:revInfo xmlns:a="http://schemas.openxmlformats.org/drawingml/2006/main" xmlns:r="http://schemas.openxmlformats.org/officeDocument/2006/relationships" xmlns:p1510="http://schemas.microsoft.com/office/powerpoint/2015/10/main">
+  <p1510:revLst>
+    <p1510:client id="{01E73667-2BEF-4007-AD34-DC26F6381063}" v="17" dt="2023-12-15T15:07:34.288"/>
+  </p1510:revLst>
+</p1510:revInfo>
+</file>
+
 <file path=ppt/changesInfos/changesInfo1.xml><?xml version="1.0" encoding="utf-8"?>
 <pc:chgInfo xmlns:a="http://schemas.openxmlformats.org/drawingml/2006/main" xmlns:r="http://schemas.openxmlformats.org/officeDocument/2006/relationships" xmlns:ac="http://schemas.microsoft.com/office/drawing/2013/main/command" xmlns:pc="http://schemas.microsoft.com/office/powerpoint/2013/main/command">
   <pc:docChgLst>
@@ -177,7 +190,7 @@
   <pc:docChgLst>
     <pc:chgData name="Philippe Baucour" userId="5102170ae7533958" providerId="LiveId" clId="{01E73667-2BEF-4007-AD34-DC26F6381063}"/>
     <pc:docChg chg="undo custSel addSld delSld modSld sldOrd">
-      <pc:chgData name="Philippe Baucour" userId="5102170ae7533958" providerId="LiveId" clId="{01E73667-2BEF-4007-AD34-DC26F6381063}" dt="2023-12-13T22:56:26.227" v="7421" actId="20577"/>
+      <pc:chgData name="Philippe Baucour" userId="5102170ae7533958" providerId="LiveId" clId="{01E73667-2BEF-4007-AD34-DC26F6381063}" dt="2023-12-15T15:16:10.652" v="13152" actId="20577"/>
       <pc:docMkLst>
         <pc:docMk/>
       </pc:docMkLst>
@@ -212,12 +225,36 @@
           </ac:picMkLst>
         </pc:picChg>
       </pc:sldChg>
-      <pc:sldChg chg="add">
-        <pc:chgData name="Philippe Baucour" userId="5102170ae7533958" providerId="LiveId" clId="{01E73667-2BEF-4007-AD34-DC26F6381063}" dt="2023-12-12T23:07:06.252" v="4500"/>
+      <pc:sldChg chg="modSp add mod">
+        <pc:chgData name="Philippe Baucour" userId="5102170ae7533958" providerId="LiveId" clId="{01E73667-2BEF-4007-AD34-DC26F6381063}" dt="2023-12-15T13:05:56.836" v="7725" actId="1035"/>
         <pc:sldMkLst>
           <pc:docMk/>
           <pc:sldMk cId="923314547" sldId="257"/>
         </pc:sldMkLst>
+        <pc:spChg chg="mod">
+          <ac:chgData name="Philippe Baucour" userId="5102170ae7533958" providerId="LiveId" clId="{01E73667-2BEF-4007-AD34-DC26F6381063}" dt="2023-12-15T13:05:56.836" v="7725" actId="1035"/>
+          <ac:spMkLst>
+            <pc:docMk/>
+            <pc:sldMk cId="923314547" sldId="257"/>
+            <ac:spMk id="6" creationId="{BB24FE5D-6D2A-616B-121A-C3FE5583F1F5}"/>
+          </ac:spMkLst>
+        </pc:spChg>
+        <pc:spChg chg="mod">
+          <ac:chgData name="Philippe Baucour" userId="5102170ae7533958" providerId="LiveId" clId="{01E73667-2BEF-4007-AD34-DC26F6381063}" dt="2023-12-15T13:05:56.836" v="7725" actId="1035"/>
+          <ac:spMkLst>
+            <pc:docMk/>
+            <pc:sldMk cId="923314547" sldId="257"/>
+            <ac:spMk id="7" creationId="{21E3DF4C-640B-192B-B682-75E0B424338B}"/>
+          </ac:spMkLst>
+        </pc:spChg>
+        <pc:picChg chg="mod">
+          <ac:chgData name="Philippe Baucour" userId="5102170ae7533958" providerId="LiveId" clId="{01E73667-2BEF-4007-AD34-DC26F6381063}" dt="2023-12-15T13:05:56.836" v="7725" actId="1035"/>
+          <ac:picMkLst>
+            <pc:docMk/>
+            <pc:sldMk cId="923314547" sldId="257"/>
+            <ac:picMk id="5" creationId="{98E9596C-500A-2A56-5CF0-751EF21D3B1B}"/>
+          </ac:picMkLst>
+        </pc:picChg>
       </pc:sldChg>
       <pc:sldChg chg="modSp del mod">
         <pc:chgData name="Philippe Baucour" userId="5102170ae7533958" providerId="LiveId" clId="{01E73667-2BEF-4007-AD34-DC26F6381063}" dt="2023-12-12T23:07:00.576" v="4499" actId="2696"/>
@@ -235,13 +272,21 @@
         </pc:picChg>
       </pc:sldChg>
       <pc:sldChg chg="addSp modSp mod ord">
-        <pc:chgData name="Philippe Baucour" userId="5102170ae7533958" providerId="LiveId" clId="{01E73667-2BEF-4007-AD34-DC26F6381063}" dt="2023-12-13T08:27:45.323" v="5791" actId="108"/>
+        <pc:chgData name="Philippe Baucour" userId="5102170ae7533958" providerId="LiveId" clId="{01E73667-2BEF-4007-AD34-DC26F6381063}" dt="2023-12-15T13:04:41.692" v="7651" actId="20577"/>
         <pc:sldMkLst>
           <pc:docMk/>
           <pc:sldMk cId="689231984" sldId="258"/>
         </pc:sldMkLst>
+        <pc:spChg chg="mod">
+          <ac:chgData name="Philippe Baucour" userId="5102170ae7533958" providerId="LiveId" clId="{01E73667-2BEF-4007-AD34-DC26F6381063}" dt="2023-12-15T13:04:41.692" v="7651" actId="20577"/>
+          <ac:spMkLst>
+            <pc:docMk/>
+            <pc:sldMk cId="689231984" sldId="258"/>
+            <ac:spMk id="3" creationId="{C5F7CF14-B2FB-D063-50C1-744E3A030AE9}"/>
+          </ac:spMkLst>
+        </pc:spChg>
         <pc:spChg chg="add mod">
-          <ac:chgData name="Philippe Baucour" userId="5102170ae7533958" providerId="LiveId" clId="{01E73667-2BEF-4007-AD34-DC26F6381063}" dt="2023-12-12T23:11:48.685" v="4607" actId="1076"/>
+          <ac:chgData name="Philippe Baucour" userId="5102170ae7533958" providerId="LiveId" clId="{01E73667-2BEF-4007-AD34-DC26F6381063}" dt="2023-12-15T13:03:13.335" v="7516" actId="1076"/>
           <ac:spMkLst>
             <pc:docMk/>
             <pc:sldMk cId="689231984" sldId="258"/>
@@ -249,7 +294,7 @@
           </ac:spMkLst>
         </pc:spChg>
         <pc:picChg chg="mod">
-          <ac:chgData name="Philippe Baucour" userId="5102170ae7533958" providerId="LiveId" clId="{01E73667-2BEF-4007-AD34-DC26F6381063}" dt="2023-12-13T08:27:45.323" v="5791" actId="108"/>
+          <ac:chgData name="Philippe Baucour" userId="5102170ae7533958" providerId="LiveId" clId="{01E73667-2BEF-4007-AD34-DC26F6381063}" dt="2023-12-15T13:02:38.094" v="7445" actId="14100"/>
           <ac:picMkLst>
             <pc:docMk/>
             <pc:sldMk cId="689231984" sldId="258"/>
@@ -257,7 +302,7 @@
           </ac:picMkLst>
         </pc:picChg>
         <pc:picChg chg="mod">
-          <ac:chgData name="Philippe Baucour" userId="5102170ae7533958" providerId="LiveId" clId="{01E73667-2BEF-4007-AD34-DC26F6381063}" dt="2023-12-10T23:55:06.477" v="976" actId="108"/>
+          <ac:chgData name="Philippe Baucour" userId="5102170ae7533958" providerId="LiveId" clId="{01E73667-2BEF-4007-AD34-DC26F6381063}" dt="2023-12-15T13:02:46.150" v="7511" actId="1038"/>
           <ac:picMkLst>
             <pc:docMk/>
             <pc:sldMk cId="689231984" sldId="258"/>
@@ -459,7 +504,7 @@
         </pc:picChg>
       </pc:sldChg>
       <pc:sldChg chg="addSp delSp modSp new mod ord">
-        <pc:chgData name="Philippe Baucour" userId="5102170ae7533958" providerId="LiveId" clId="{01E73667-2BEF-4007-AD34-DC26F6381063}" dt="2023-12-12T23:12:58.282" v="4629" actId="5793"/>
+        <pc:chgData name="Philippe Baucour" userId="5102170ae7533958" providerId="LiveId" clId="{01E73667-2BEF-4007-AD34-DC26F6381063}" dt="2023-12-15T13:07:00.388" v="7775" actId="1038"/>
         <pc:sldMkLst>
           <pc:docMk/>
           <pc:sldMk cId="592899133" sldId="263"/>
@@ -481,7 +526,7 @@
           </ac:spMkLst>
         </pc:spChg>
         <pc:spChg chg="add mod">
-          <ac:chgData name="Philippe Baucour" userId="5102170ae7533958" providerId="LiveId" clId="{01E73667-2BEF-4007-AD34-DC26F6381063}" dt="2023-12-10T13:46:44.901" v="36" actId="1076"/>
+          <ac:chgData name="Philippe Baucour" userId="5102170ae7533958" providerId="LiveId" clId="{01E73667-2BEF-4007-AD34-DC26F6381063}" dt="2023-12-15T13:07:00.388" v="7775" actId="1038"/>
           <ac:spMkLst>
             <pc:docMk/>
             <pc:sldMk cId="592899133" sldId="263"/>
@@ -562,13 +607,13 @@
         </pc:picChg>
       </pc:sldChg>
       <pc:sldChg chg="addSp delSp modSp add mod ord">
-        <pc:chgData name="Philippe Baucour" userId="5102170ae7533958" providerId="LiveId" clId="{01E73667-2BEF-4007-AD34-DC26F6381063}" dt="2023-12-13T22:47:56.194" v="7306" actId="20577"/>
+        <pc:chgData name="Philippe Baucour" userId="5102170ae7533958" providerId="LiveId" clId="{01E73667-2BEF-4007-AD34-DC26F6381063}" dt="2023-12-15T13:01:57.649" v="7444" actId="20577"/>
         <pc:sldMkLst>
           <pc:docMk/>
           <pc:sldMk cId="3156533495" sldId="264"/>
         </pc:sldMkLst>
         <pc:spChg chg="mod">
-          <ac:chgData name="Philippe Baucour" userId="5102170ae7533958" providerId="LiveId" clId="{01E73667-2BEF-4007-AD34-DC26F6381063}" dt="2023-12-13T22:47:56.194" v="7306" actId="20577"/>
+          <ac:chgData name="Philippe Baucour" userId="5102170ae7533958" providerId="LiveId" clId="{01E73667-2BEF-4007-AD34-DC26F6381063}" dt="2023-12-15T13:01:57.649" v="7444" actId="20577"/>
           <ac:spMkLst>
             <pc:docMk/>
             <pc:sldMk cId="3156533495" sldId="264"/>
@@ -1154,7 +1199,7 @@
         </pc:spChg>
       </pc:sldChg>
       <pc:sldChg chg="modSp new mod">
-        <pc:chgData name="Philippe Baucour" userId="5102170ae7533958" providerId="LiveId" clId="{01E73667-2BEF-4007-AD34-DC26F6381063}" dt="2023-12-13T08:53:12.250" v="6547" actId="20577"/>
+        <pc:chgData name="Philippe Baucour" userId="5102170ae7533958" providerId="LiveId" clId="{01E73667-2BEF-4007-AD34-DC26F6381063}" dt="2023-12-15T13:08:51.918" v="7852" actId="20577"/>
         <pc:sldMkLst>
           <pc:docMk/>
           <pc:sldMk cId="937257522" sldId="273"/>
@@ -1168,7 +1213,7 @@
           </ac:spMkLst>
         </pc:spChg>
         <pc:spChg chg="mod">
-          <ac:chgData name="Philippe Baucour" userId="5102170ae7533958" providerId="LiveId" clId="{01E73667-2BEF-4007-AD34-DC26F6381063}" dt="2023-12-13T08:53:12.250" v="6547" actId="20577"/>
+          <ac:chgData name="Philippe Baucour" userId="5102170ae7533958" providerId="LiveId" clId="{01E73667-2BEF-4007-AD34-DC26F6381063}" dt="2023-12-15T13:08:51.918" v="7852" actId="20577"/>
           <ac:spMkLst>
             <pc:docMk/>
             <pc:sldMk cId="937257522" sldId="273"/>
@@ -1199,12 +1244,28 @@
           </ac:picMkLst>
         </pc:picChg>
       </pc:sldChg>
-      <pc:sldChg chg="add">
-        <pc:chgData name="Philippe Baucour" userId="5102170ae7533958" providerId="LiveId" clId="{01E73667-2BEF-4007-AD34-DC26F6381063}" dt="2023-12-12T23:07:17.132" v="4502"/>
+      <pc:sldChg chg="addSp modSp add mod">
+        <pc:chgData name="Philippe Baucour" userId="5102170ae7533958" providerId="LiveId" clId="{01E73667-2BEF-4007-AD34-DC26F6381063}" dt="2023-12-15T13:07:31.403" v="7782" actId="20577"/>
         <pc:sldMkLst>
           <pc:docMk/>
           <pc:sldMk cId="3168452550" sldId="274"/>
         </pc:sldMkLst>
+        <pc:spChg chg="mod">
+          <ac:chgData name="Philippe Baucour" userId="5102170ae7533958" providerId="LiveId" clId="{01E73667-2BEF-4007-AD34-DC26F6381063}" dt="2023-12-15T13:07:31.403" v="7782" actId="20577"/>
+          <ac:spMkLst>
+            <pc:docMk/>
+            <pc:sldMk cId="3168452550" sldId="274"/>
+            <ac:spMk id="3" creationId="{F78D7F06-2623-B40C-C4D3-26B420BAC7E5}"/>
+          </ac:spMkLst>
+        </pc:spChg>
+        <pc:spChg chg="add mod">
+          <ac:chgData name="Philippe Baucour" userId="5102170ae7533958" providerId="LiveId" clId="{01E73667-2BEF-4007-AD34-DC26F6381063}" dt="2023-12-15T13:07:24.746" v="7780" actId="1076"/>
+          <ac:spMkLst>
+            <pc:docMk/>
+            <pc:sldMk cId="3168452550" sldId="274"/>
+            <ac:spMk id="4" creationId="{23563A7B-144F-CF05-F95F-A2541B8AFB1C}"/>
+          </ac:spMkLst>
+        </pc:spChg>
       </pc:sldChg>
       <pc:sldChg chg="modSp new del mod">
         <pc:chgData name="Philippe Baucour" userId="5102170ae7533958" providerId="LiveId" clId="{01E73667-2BEF-4007-AD34-DC26F6381063}" dt="2023-12-12T23:04:42.644" v="4488" actId="47"/>
@@ -1618,8 +1679,8 @@
           </ac:spMkLst>
         </pc:spChg>
       </pc:sldChg>
-      <pc:sldChg chg="addSp delSp modSp new mod">
-        <pc:chgData name="Philippe Baucour" userId="5102170ae7533958" providerId="LiveId" clId="{01E73667-2BEF-4007-AD34-DC26F6381063}" dt="2023-12-13T22:38:28.869" v="7271" actId="1076"/>
+      <pc:sldChg chg="addSp delSp modSp new mod modNotesTx">
+        <pc:chgData name="Philippe Baucour" userId="5102170ae7533958" providerId="LiveId" clId="{01E73667-2BEF-4007-AD34-DC26F6381063}" dt="2023-12-15T15:16:10.652" v="13152" actId="20577"/>
         <pc:sldMkLst>
           <pc:docMk/>
           <pc:sldMk cId="4079956193" sldId="286"/>
@@ -1633,11 +1694,19 @@
           </ac:spMkLst>
         </pc:spChg>
         <pc:spChg chg="mod">
-          <ac:chgData name="Philippe Baucour" userId="5102170ae7533958" providerId="LiveId" clId="{01E73667-2BEF-4007-AD34-DC26F6381063}" dt="2023-12-13T22:31:57.081" v="7167" actId="27636"/>
+          <ac:chgData name="Philippe Baucour" userId="5102170ae7533958" providerId="LiveId" clId="{01E73667-2BEF-4007-AD34-DC26F6381063}" dt="2023-12-15T14:36:49.302" v="11469" actId="20577"/>
           <ac:spMkLst>
             <pc:docMk/>
             <pc:sldMk cId="4079956193" sldId="286"/>
             <ac:spMk id="3" creationId="{50F452AD-BB6D-A971-A6ED-43CD09F7AB2B}"/>
+          </ac:spMkLst>
+        </pc:spChg>
+        <pc:spChg chg="add del mod">
+          <ac:chgData name="Philippe Baucour" userId="5102170ae7533958" providerId="LiveId" clId="{01E73667-2BEF-4007-AD34-DC26F6381063}" dt="2023-12-15T14:24:37.782" v="10930" actId="478"/>
+          <ac:spMkLst>
+            <pc:docMk/>
+            <pc:sldMk cId="4079956193" sldId="286"/>
+            <ac:spMk id="4" creationId="{FAFA1DC1-2376-9B4F-64BC-A33AEB6AF7AB}"/>
           </ac:spMkLst>
         </pc:spChg>
         <pc:spChg chg="add mod">
@@ -1680,12 +1749,28 @@
             <ac:spMk id="10" creationId="{14839010-0916-A3B6-1457-F7A0BE0377EF}"/>
           </ac:spMkLst>
         </pc:spChg>
+        <pc:spChg chg="add del mod">
+          <ac:chgData name="Philippe Baucour" userId="5102170ae7533958" providerId="LiveId" clId="{01E73667-2BEF-4007-AD34-DC26F6381063}" dt="2023-12-15T14:37:39.941" v="11500" actId="478"/>
+          <ac:spMkLst>
+            <pc:docMk/>
+            <pc:sldMk cId="4079956193" sldId="286"/>
+            <ac:spMk id="10" creationId="{ADA04905-B256-12C0-0BAF-634E7E00C83F}"/>
+          </ac:spMkLst>
+        </pc:spChg>
         <pc:spChg chg="add mod">
-          <ac:chgData name="Philippe Baucour" userId="5102170ae7533958" providerId="LiveId" clId="{01E73667-2BEF-4007-AD34-DC26F6381063}" dt="2023-12-13T22:38:19.881" v="7270" actId="1076"/>
+          <ac:chgData name="Philippe Baucour" userId="5102170ae7533958" providerId="LiveId" clId="{01E73667-2BEF-4007-AD34-DC26F6381063}" dt="2023-12-15T14:37:54.159" v="11501" actId="1076"/>
           <ac:spMkLst>
             <pc:docMk/>
             <pc:sldMk cId="4079956193" sldId="286"/>
             <ac:spMk id="11" creationId="{45B9CAB5-DFCC-48F4-759E-E1EEC02148C6}"/>
+          </ac:spMkLst>
+        </pc:spChg>
+        <pc:spChg chg="add mod">
+          <ac:chgData name="Philippe Baucour" userId="5102170ae7533958" providerId="LiveId" clId="{01E73667-2BEF-4007-AD34-DC26F6381063}" dt="2023-12-15T15:14:52.997" v="13136" actId="6549"/>
+          <ac:spMkLst>
+            <pc:docMk/>
+            <pc:sldMk cId="4079956193" sldId="286"/>
+            <ac:spMk id="12" creationId="{620BC2E6-F7F1-762D-A243-2656FBC57365}"/>
           </ac:spMkLst>
         </pc:spChg>
         <pc:spChg chg="add del mod">
@@ -1697,7 +1782,7 @@
           </ac:spMkLst>
         </pc:spChg>
         <pc:spChg chg="add mod">
-          <ac:chgData name="Philippe Baucour" userId="5102170ae7533958" providerId="LiveId" clId="{01E73667-2BEF-4007-AD34-DC26F6381063}" dt="2023-12-13T22:38:28.869" v="7271" actId="1076"/>
+          <ac:chgData name="Philippe Baucour" userId="5102170ae7533958" providerId="LiveId" clId="{01E73667-2BEF-4007-AD34-DC26F6381063}" dt="2023-12-15T14:37:59.921" v="11502" actId="14100"/>
           <ac:spMkLst>
             <pc:docMk/>
             <pc:sldMk cId="4079956193" sldId="286"/>
@@ -1772,6 +1857,144 @@
         <pc:sldMkLst>
           <pc:docMk/>
           <pc:sldMk cId="4127487384" sldId="289"/>
+        </pc:sldMkLst>
+      </pc:sldChg>
+      <pc:sldChg chg="addSp delSp modSp new mod ord modClrScheme chgLayout">
+        <pc:chgData name="Philippe Baucour" userId="5102170ae7533958" providerId="LiveId" clId="{01E73667-2BEF-4007-AD34-DC26F6381063}" dt="2023-12-15T14:00:47.499" v="10737" actId="20577"/>
+        <pc:sldMkLst>
+          <pc:docMk/>
+          <pc:sldMk cId="2196411414" sldId="290"/>
+        </pc:sldMkLst>
+        <pc:spChg chg="del mod ord">
+          <ac:chgData name="Philippe Baucour" userId="5102170ae7533958" providerId="LiveId" clId="{01E73667-2BEF-4007-AD34-DC26F6381063}" dt="2023-12-15T13:09:57.605" v="7854" actId="700"/>
+          <ac:spMkLst>
+            <pc:docMk/>
+            <pc:sldMk cId="2196411414" sldId="290"/>
+            <ac:spMk id="2" creationId="{D6CB9780-8DF8-318B-716D-BF2661A615A8}"/>
+          </ac:spMkLst>
+        </pc:spChg>
+        <pc:spChg chg="del mod ord">
+          <ac:chgData name="Philippe Baucour" userId="5102170ae7533958" providerId="LiveId" clId="{01E73667-2BEF-4007-AD34-DC26F6381063}" dt="2023-12-15T13:09:57.605" v="7854" actId="700"/>
+          <ac:spMkLst>
+            <pc:docMk/>
+            <pc:sldMk cId="2196411414" sldId="290"/>
+            <ac:spMk id="3" creationId="{2AF26A40-A3BF-E15E-D7E3-35783354F0DB}"/>
+          </ac:spMkLst>
+        </pc:spChg>
+        <pc:spChg chg="add mod ord">
+          <ac:chgData name="Philippe Baucour" userId="5102170ae7533958" providerId="LiveId" clId="{01E73667-2BEF-4007-AD34-DC26F6381063}" dt="2023-12-15T13:10:06.211" v="7868" actId="20577"/>
+          <ac:spMkLst>
+            <pc:docMk/>
+            <pc:sldMk cId="2196411414" sldId="290"/>
+            <ac:spMk id="4" creationId="{E0EF6534-E2A9-B8D6-2479-C32AFD155124}"/>
+          </ac:spMkLst>
+        </pc:spChg>
+        <pc:spChg chg="add mod ord">
+          <ac:chgData name="Philippe Baucour" userId="5102170ae7533958" providerId="LiveId" clId="{01E73667-2BEF-4007-AD34-DC26F6381063}" dt="2023-12-15T14:00:47.499" v="10737" actId="20577"/>
+          <ac:spMkLst>
+            <pc:docMk/>
+            <pc:sldMk cId="2196411414" sldId="290"/>
+            <ac:spMk id="5" creationId="{E7243C4C-A2DA-48C8-744A-8AB1E7248236}"/>
+          </ac:spMkLst>
+        </pc:spChg>
+      </pc:sldChg>
+      <pc:sldChg chg="modSp new mod modNotesTx">
+        <pc:chgData name="Philippe Baucour" userId="5102170ae7533958" providerId="LiveId" clId="{01E73667-2BEF-4007-AD34-DC26F6381063}" dt="2023-12-15T13:57:48.877" v="10675" actId="20577"/>
+        <pc:sldMkLst>
+          <pc:docMk/>
+          <pc:sldMk cId="670108457" sldId="291"/>
+        </pc:sldMkLst>
+        <pc:spChg chg="mod">
+          <ac:chgData name="Philippe Baucour" userId="5102170ae7533958" providerId="LiveId" clId="{01E73667-2BEF-4007-AD34-DC26F6381063}" dt="2023-12-15T13:26:20.283" v="9062" actId="20577"/>
+          <ac:spMkLst>
+            <pc:docMk/>
+            <pc:sldMk cId="670108457" sldId="291"/>
+            <ac:spMk id="2" creationId="{370F5FAD-9F53-AAE9-AB90-BF22980F842C}"/>
+          </ac:spMkLst>
+        </pc:spChg>
+        <pc:spChg chg="mod">
+          <ac:chgData name="Philippe Baucour" userId="5102170ae7533958" providerId="LiveId" clId="{01E73667-2BEF-4007-AD34-DC26F6381063}" dt="2023-12-15T13:57:48.877" v="10675" actId="20577"/>
+          <ac:spMkLst>
+            <pc:docMk/>
+            <pc:sldMk cId="670108457" sldId="291"/>
+            <ac:spMk id="3" creationId="{913331AE-0180-6BC1-67DA-C0635E1BC504}"/>
+          </ac:spMkLst>
+        </pc:spChg>
+      </pc:sldChg>
+      <pc:sldChg chg="modSp new mod ord">
+        <pc:chgData name="Philippe Baucour" userId="5102170ae7533958" providerId="LiveId" clId="{01E73667-2BEF-4007-AD34-DC26F6381063}" dt="2023-12-15T14:02:34.773" v="10739" actId="20577"/>
+        <pc:sldMkLst>
+          <pc:docMk/>
+          <pc:sldMk cId="2196644587" sldId="292"/>
+        </pc:sldMkLst>
+        <pc:spChg chg="mod">
+          <ac:chgData name="Philippe Baucour" userId="5102170ae7533958" providerId="LiveId" clId="{01E73667-2BEF-4007-AD34-DC26F6381063}" dt="2023-12-15T13:29:39.611" v="9310" actId="20577"/>
+          <ac:spMkLst>
+            <pc:docMk/>
+            <pc:sldMk cId="2196644587" sldId="292"/>
+            <ac:spMk id="2" creationId="{43027863-5F12-C0FC-41B6-6A37F08C783C}"/>
+          </ac:spMkLst>
+        </pc:spChg>
+        <pc:spChg chg="mod">
+          <ac:chgData name="Philippe Baucour" userId="5102170ae7533958" providerId="LiveId" clId="{01E73667-2BEF-4007-AD34-DC26F6381063}" dt="2023-12-15T14:02:34.773" v="10739" actId="20577"/>
+          <ac:spMkLst>
+            <pc:docMk/>
+            <pc:sldMk cId="2196644587" sldId="292"/>
+            <ac:spMk id="3" creationId="{7343D8EC-44D1-AF04-E6CC-7986F8B14507}"/>
+          </ac:spMkLst>
+        </pc:spChg>
+      </pc:sldChg>
+      <pc:sldChg chg="modSp new mod">
+        <pc:chgData name="Philippe Baucour" userId="5102170ae7533958" providerId="LiveId" clId="{01E73667-2BEF-4007-AD34-DC26F6381063}" dt="2023-12-15T13:59:20.179" v="10723" actId="20577"/>
+        <pc:sldMkLst>
+          <pc:docMk/>
+          <pc:sldMk cId="3721109662" sldId="293"/>
+        </pc:sldMkLst>
+        <pc:spChg chg="mod">
+          <ac:chgData name="Philippe Baucour" userId="5102170ae7533958" providerId="LiveId" clId="{01E73667-2BEF-4007-AD34-DC26F6381063}" dt="2023-12-15T13:25:59.544" v="9058" actId="20577"/>
+          <ac:spMkLst>
+            <pc:docMk/>
+            <pc:sldMk cId="3721109662" sldId="293"/>
+            <ac:spMk id="2" creationId="{6F0D182C-1E5D-ED58-7153-E1A941AD5452}"/>
+          </ac:spMkLst>
+        </pc:spChg>
+        <pc:spChg chg="mod">
+          <ac:chgData name="Philippe Baucour" userId="5102170ae7533958" providerId="LiveId" clId="{01E73667-2BEF-4007-AD34-DC26F6381063}" dt="2023-12-15T13:59:20.179" v="10723" actId="20577"/>
+          <ac:spMkLst>
+            <pc:docMk/>
+            <pc:sldMk cId="3721109662" sldId="293"/>
+            <ac:spMk id="3" creationId="{C6C930C7-903E-CFFA-C59E-99506DCC3630}"/>
+          </ac:spMkLst>
+        </pc:spChg>
+      </pc:sldChg>
+      <pc:sldChg chg="modSp new mod ord">
+        <pc:chgData name="Philippe Baucour" userId="5102170ae7533958" providerId="LiveId" clId="{01E73667-2BEF-4007-AD34-DC26F6381063}" dt="2023-12-15T13:59:56.278" v="10727"/>
+        <pc:sldMkLst>
+          <pc:docMk/>
+          <pc:sldMk cId="2540323896" sldId="294"/>
+        </pc:sldMkLst>
+        <pc:spChg chg="mod">
+          <ac:chgData name="Philippe Baucour" userId="5102170ae7533958" providerId="LiveId" clId="{01E73667-2BEF-4007-AD34-DC26F6381063}" dt="2023-12-15T13:34:25.812" v="9590" actId="20577"/>
+          <ac:spMkLst>
+            <pc:docMk/>
+            <pc:sldMk cId="2540323896" sldId="294"/>
+            <ac:spMk id="2" creationId="{91D577C0-85A9-8612-8D5E-F221D19DDEA3}"/>
+          </ac:spMkLst>
+        </pc:spChg>
+        <pc:spChg chg="mod">
+          <ac:chgData name="Philippe Baucour" userId="5102170ae7533958" providerId="LiveId" clId="{01E73667-2BEF-4007-AD34-DC26F6381063}" dt="2023-12-15T13:54:30.941" v="10564" actId="20577"/>
+          <ac:spMkLst>
+            <pc:docMk/>
+            <pc:sldMk cId="2540323896" sldId="294"/>
+            <ac:spMk id="3" creationId="{EB0FC026-327D-475F-13A4-A3A9BB6066E7}"/>
+          </ac:spMkLst>
+        </pc:spChg>
+      </pc:sldChg>
+      <pc:sldChg chg="new del">
+        <pc:chgData name="Philippe Baucour" userId="5102170ae7533958" providerId="LiveId" clId="{01E73667-2BEF-4007-AD34-DC26F6381063}" dt="2023-12-15T14:48:04.354" v="12014" actId="680"/>
+        <pc:sldMkLst>
+          <pc:docMk/>
+          <pc:sldMk cId="1975059802" sldId="295"/>
         </pc:sldMkLst>
       </pc:sldChg>
     </pc:docChg>
@@ -2277,6 +2500,323 @@
     <p:extLst>
       <p:ext uri="{BB962C8B-B14F-4D97-AF65-F5344CB8AC3E}">
         <p14:creationId xmlns:p14="http://schemas.microsoft.com/office/powerpoint/2010/main" val="1907524118"/>
+      </p:ext>
+    </p:extLst>
+  </p:cSld>
+  <p:clrMapOvr>
+    <a:masterClrMapping/>
+  </p:clrMapOvr>
+</p:notes>
+</file>
+
+<file path=ppt/notesSlides/notesSlide2.xml><?xml version="1.0" encoding="utf-8"?>
+<p:notes xmlns:a="http://schemas.openxmlformats.org/drawingml/2006/main" xmlns:r="http://schemas.openxmlformats.org/officeDocument/2006/relationships" xmlns:p="http://schemas.openxmlformats.org/presentationml/2006/main">
+  <p:cSld>
+    <p:spTree>
+      <p:nvGrpSpPr>
+        <p:cNvPr id="1" name=""/>
+        <p:cNvGrpSpPr/>
+        <p:nvPr/>
+      </p:nvGrpSpPr>
+      <p:grpSpPr>
+        <a:xfrm>
+          <a:off x="0" y="0"/>
+          <a:ext cx="0" cy="0"/>
+          <a:chOff x="0" y="0"/>
+          <a:chExt cx="0" cy="0"/>
+        </a:xfrm>
+      </p:grpSpPr>
+      <p:sp>
+        <p:nvSpPr>
+          <p:cNvPr id="2" name="Espace réservé de l'image des diapositives 1"/>
+          <p:cNvSpPr>
+            <a:spLocks noGrp="1" noRot="1" noChangeAspect="1"/>
+          </p:cNvSpPr>
+          <p:nvPr>
+            <p:ph type="sldImg"/>
+          </p:nvPr>
+        </p:nvSpPr>
+        <p:spPr/>
+      </p:sp>
+      <p:sp>
+        <p:nvSpPr>
+          <p:cNvPr id="3" name="Espace réservé des notes 2"/>
+          <p:cNvSpPr>
+            <a:spLocks noGrp="1"/>
+          </p:cNvSpPr>
+          <p:nvPr>
+            <p:ph type="body" idx="1"/>
+          </p:nvPr>
+        </p:nvSpPr>
+        <p:spPr/>
+        <p:txBody>
+          <a:bodyPr/>
+          <a:lstStyle/>
+          <a:p>
+            <a:r>
+              <a:rPr lang="fr-FR" dirty="0"/>
+              <a:t>Pour le cancer (=1)</a:t>
+            </a:r>
+          </a:p>
+          <a:p>
+            <a:r>
+              <a:rPr lang="fr-FR" dirty="0"/>
+              <a:t>On se place en TP</a:t>
+            </a:r>
+          </a:p>
+          <a:p>
+            <a:r>
+              <a:rPr lang="fr-FR" dirty="0"/>
+              <a:t>On veut un FP faible ?  On observe pas de cancer (=0) alors qu'on a prédit cancer ? Je sais pas   </a:t>
+            </a:r>
+          </a:p>
+          <a:p>
+            <a:r>
+              <a:rPr lang="fr-FR" dirty="0"/>
+              <a:t>On veut un FN faible ? On observe un cancer (=1)        alors qu'on a prédit pas de cancer ? Non ! =&gt; FN=0 =&gt; </a:t>
+            </a:r>
+            <a:r>
+              <a:rPr lang="fr-FR" dirty="0" err="1"/>
+              <a:t>Recall</a:t>
+            </a:r>
+            <a:r>
+              <a:rPr lang="fr-FR" dirty="0"/>
+              <a:t> = 1</a:t>
+            </a:r>
+          </a:p>
+          <a:p>
+            <a:endParaRPr lang="fr-FR" dirty="0"/>
+          </a:p>
+          <a:p>
+            <a:r>
+              <a:rPr lang="fr-FR" dirty="0"/>
+              <a:t>Carte bancaire identifiée comme fausse (=1)</a:t>
+            </a:r>
+          </a:p>
+          <a:p>
+            <a:r>
+              <a:rPr lang="fr-FR" dirty="0"/>
+              <a:t>On se place en TP </a:t>
+            </a:r>
+          </a:p>
+          <a:p>
+            <a:r>
+              <a:rPr lang="fr-FR" dirty="0"/>
+              <a:t>On veut un FN faible? Carte identifiée fausse alors qu'elle est vraie ? Je ne sais pas</a:t>
+            </a:r>
+          </a:p>
+          <a:p>
+            <a:r>
+              <a:rPr lang="fr-FR" dirty="0"/>
+              <a:t>On veut un FP faible? Carte identifiée vraie alors qu'elle est observée comme fausse ? Non ! =&gt; FP=0 =&gt; </a:t>
+            </a:r>
+            <a:r>
+              <a:rPr lang="fr-FR" dirty="0" err="1"/>
+              <a:t>Precision</a:t>
+            </a:r>
+            <a:r>
+              <a:rPr lang="fr-FR" dirty="0"/>
+              <a:t> =1</a:t>
+            </a:r>
+          </a:p>
+          <a:p>
+            <a:endParaRPr lang="fr-FR" dirty="0"/>
+          </a:p>
+          <a:p>
+            <a:r>
+              <a:rPr lang="fr-FR" dirty="0"/>
+              <a:t>Mails identifiés comme SPAM (=1)</a:t>
+            </a:r>
+          </a:p>
+          <a:p>
+            <a:r>
+              <a:rPr lang="fr-FR" dirty="0"/>
+              <a:t>On se place en TP</a:t>
+            </a:r>
+          </a:p>
+          <a:p>
+            <a:r>
+              <a:rPr lang="fr-FR" dirty="0"/>
+              <a:t>On veut un FN faible ? Mail observé comme SPAM alors qu'on l'a prédit comme BON ? Je sais pas</a:t>
+            </a:r>
+          </a:p>
+          <a:p>
+            <a:r>
+              <a:rPr lang="fr-FR" dirty="0"/>
+              <a:t>On veut un FP faible ? Mail observé comme BON alors qu'on l'a prédit comme SPAM ? Non ! =&gt; FP=0 =&gt; </a:t>
+            </a:r>
+            <a:r>
+              <a:rPr lang="fr-FR" dirty="0" err="1"/>
+              <a:t>Precision</a:t>
+            </a:r>
+            <a:r>
+              <a:rPr lang="fr-FR" dirty="0"/>
+              <a:t> = 1 </a:t>
+            </a:r>
+          </a:p>
+          <a:p>
+            <a:endParaRPr lang="fr-FR" dirty="0"/>
+          </a:p>
+          <a:p>
+            <a:r>
+              <a:rPr lang="fr-FR" dirty="0"/>
+              <a:t>Mails identifiés comme BON (=1)</a:t>
+            </a:r>
+          </a:p>
+          <a:p>
+            <a:r>
+              <a:rPr lang="fr-FR" dirty="0"/>
+              <a:t>On se place en TP</a:t>
+            </a:r>
+          </a:p>
+          <a:p>
+            <a:r>
+              <a:rPr lang="fr-FR" dirty="0"/>
+              <a:t>On veut un FP faible ?  Mail observé comme SPAM alors qu'on l'a prédit comme BON ?  Je sais pas   </a:t>
+            </a:r>
+          </a:p>
+          <a:p>
+            <a:r>
+              <a:rPr lang="fr-FR" dirty="0"/>
+              <a:t>On veut un FN faible ? Mail observé BON                alors qu'on l'a prédit comme SPAM ? Non ! =&gt; FN=0 =&gt; </a:t>
+            </a:r>
+            <a:r>
+              <a:rPr lang="fr-FR" dirty="0" err="1"/>
+              <a:t>Recall</a:t>
+            </a:r>
+            <a:r>
+              <a:rPr lang="fr-FR" dirty="0"/>
+              <a:t> = 1</a:t>
+            </a:r>
+          </a:p>
+          <a:p>
+            <a:endParaRPr lang="fr-FR" dirty="0"/>
+          </a:p>
+          <a:p>
+            <a:endParaRPr lang="fr-FR" dirty="0"/>
+          </a:p>
+          <a:p>
+            <a:endParaRPr lang="fr-FR" dirty="0"/>
+          </a:p>
+        </p:txBody>
+      </p:sp>
+      <p:sp>
+        <p:nvSpPr>
+          <p:cNvPr id="4" name="Espace réservé du numéro de diapositive 3"/>
+          <p:cNvSpPr>
+            <a:spLocks noGrp="1"/>
+          </p:cNvSpPr>
+          <p:nvPr>
+            <p:ph type="sldNum" sz="quarter" idx="5"/>
+          </p:nvPr>
+        </p:nvSpPr>
+        <p:spPr/>
+        <p:txBody>
+          <a:bodyPr/>
+          <a:lstStyle/>
+          <a:p>
+            <a:fld id="{CA52ACDA-CAD7-4952-B2DF-2528E011DCB5}" type="slidenum">
+              <a:rPr lang="fr-FR" smtClean="0"/>
+              <a:t>30</a:t>
+            </a:fld>
+            <a:endParaRPr lang="fr-FR"/>
+          </a:p>
+        </p:txBody>
+      </p:sp>
+    </p:spTree>
+    <p:extLst>
+      <p:ext uri="{BB962C8B-B14F-4D97-AF65-F5344CB8AC3E}">
+        <p14:creationId xmlns:p14="http://schemas.microsoft.com/office/powerpoint/2010/main" val="583671224"/>
+      </p:ext>
+    </p:extLst>
+  </p:cSld>
+  <p:clrMapOvr>
+    <a:masterClrMapping/>
+  </p:clrMapOvr>
+</p:notes>
+</file>
+
+<file path=ppt/notesSlides/notesSlide3.xml><?xml version="1.0" encoding="utf-8"?>
+<p:notes xmlns:a="http://schemas.openxmlformats.org/drawingml/2006/main" xmlns:r="http://schemas.openxmlformats.org/officeDocument/2006/relationships" xmlns:p="http://schemas.openxmlformats.org/presentationml/2006/main">
+  <p:cSld>
+    <p:spTree>
+      <p:nvGrpSpPr>
+        <p:cNvPr id="1" name=""/>
+        <p:cNvGrpSpPr/>
+        <p:nvPr/>
+      </p:nvGrpSpPr>
+      <p:grpSpPr>
+        <a:xfrm>
+          <a:off x="0" y="0"/>
+          <a:ext cx="0" cy="0"/>
+          <a:chOff x="0" y="0"/>
+          <a:chExt cx="0" cy="0"/>
+        </a:xfrm>
+      </p:grpSpPr>
+      <p:sp>
+        <p:nvSpPr>
+          <p:cNvPr id="2" name="Espace réservé de l'image des diapositives 1"/>
+          <p:cNvSpPr>
+            <a:spLocks noGrp="1" noRot="1" noChangeAspect="1"/>
+          </p:cNvSpPr>
+          <p:nvPr>
+            <p:ph type="sldImg"/>
+          </p:nvPr>
+        </p:nvSpPr>
+        <p:spPr/>
+      </p:sp>
+      <p:sp>
+        <p:nvSpPr>
+          <p:cNvPr id="3" name="Espace réservé des notes 2"/>
+          <p:cNvSpPr>
+            <a:spLocks noGrp="1"/>
+          </p:cNvSpPr>
+          <p:nvPr>
+            <p:ph type="body" idx="1"/>
+          </p:nvPr>
+        </p:nvSpPr>
+        <p:spPr/>
+        <p:txBody>
+          <a:bodyPr/>
+          <a:lstStyle/>
+          <a:p>
+            <a:r>
+              <a:rPr lang="fr-FR" dirty="0"/>
+              <a:t>Open Gambit : https://www.oreilly.com/library/view/presentation-skills-that/9780133443035/book3_ch05s02.html</a:t>
+            </a:r>
+          </a:p>
+          <a:p>
+            <a:endParaRPr lang="fr-FR" dirty="0"/>
+          </a:p>
+        </p:txBody>
+      </p:sp>
+      <p:sp>
+        <p:nvSpPr>
+          <p:cNvPr id="4" name="Espace réservé du numéro de diapositive 3"/>
+          <p:cNvSpPr>
+            <a:spLocks noGrp="1"/>
+          </p:cNvSpPr>
+          <p:nvPr>
+            <p:ph type="sldNum" sz="quarter" idx="5"/>
+          </p:nvPr>
+        </p:nvSpPr>
+        <p:spPr/>
+        <p:txBody>
+          <a:bodyPr/>
+          <a:lstStyle/>
+          <a:p>
+            <a:fld id="{CA52ACDA-CAD7-4952-B2DF-2528E011DCB5}" type="slidenum">
+              <a:rPr lang="fr-FR" smtClean="0"/>
+              <a:t>38</a:t>
+            </a:fld>
+            <a:endParaRPr lang="fr-FR"/>
+          </a:p>
+        </p:txBody>
+      </p:sp>
+    </p:spTree>
+    <p:extLst>
+      <p:ext uri="{BB962C8B-B14F-4D97-AF65-F5344CB8AC3E}">
+        <p14:creationId xmlns:p14="http://schemas.microsoft.com/office/powerpoint/2010/main" val="2069620183"/>
       </p:ext>
     </p:extLst>
   </p:cSld>
@@ -5749,7 +6289,7 @@
         </p:blipFill>
         <p:spPr>
           <a:xfrm>
-            <a:off x="460090" y="1551113"/>
+            <a:off x="852780" y="1825994"/>
             <a:ext cx="10145987" cy="4625849"/>
           </a:xfrm>
           <a:prstGeom prst="rect">
@@ -5778,7 +6318,7 @@
         </p:nvSpPr>
         <p:spPr>
           <a:xfrm rot="7666661">
-            <a:off x="1822784" y="4878806"/>
+            <a:off x="2215474" y="5153687"/>
             <a:ext cx="1594185" cy="673768"/>
           </a:xfrm>
           <a:prstGeom prst="rightArrow">
@@ -5827,7 +6367,7 @@
         </p:nvSpPr>
         <p:spPr>
           <a:xfrm>
-            <a:off x="2469033" y="5031024"/>
+            <a:off x="2861723" y="5305905"/>
             <a:ext cx="301686" cy="369332"/>
           </a:xfrm>
           <a:prstGeom prst="rect">
@@ -6602,7 +7142,7 @@
         </p:nvSpPr>
         <p:spPr>
           <a:xfrm rot="14275198">
-            <a:off x="4590124" y="2676755"/>
+            <a:off x="4663053" y="2676755"/>
             <a:ext cx="1594185" cy="673768"/>
           </a:xfrm>
           <a:prstGeom prst="rightArrow">
@@ -6963,12 +7503,36 @@
             <p:ph idx="1"/>
           </p:nvPr>
         </p:nvSpPr>
-        <p:spPr/>
+        <p:spPr>
+          <a:xfrm>
+            <a:off x="838200" y="1825625"/>
+            <a:ext cx="3387630" cy="4351338"/>
+          </a:xfrm>
+        </p:spPr>
         <p:txBody>
           <a:bodyPr/>
           <a:lstStyle/>
           <a:p>
-            <a:endParaRPr lang="fr-FR" dirty="0"/>
+            <a:r>
+              <a:rPr lang="fr-FR" dirty="0"/>
+              <a:t>Installez "</a:t>
+            </a:r>
+            <a:r>
+              <a:rPr lang="fr-FR" dirty="0" err="1"/>
+              <a:t>Better</a:t>
+            </a:r>
+            <a:r>
+              <a:rPr lang="fr-FR" dirty="0"/>
+              <a:t> </a:t>
+            </a:r>
+            <a:r>
+              <a:rPr lang="fr-FR" dirty="0" err="1"/>
+              <a:t>Comments</a:t>
+            </a:r>
+            <a:r>
+              <a:rPr lang="fr-FR" dirty="0"/>
+              <a:t>" par exemple</a:t>
+            </a:r>
           </a:p>
         </p:txBody>
       </p:sp>
@@ -7002,6 +7566,55 @@
           </a:prstGeom>
         </p:spPr>
       </p:pic>
+      <p:sp>
+        <p:nvSpPr>
+          <p:cNvPr id="4" name="Flèche : droite 3">
+            <a:extLst>
+              <a:ext uri="{FF2B5EF4-FFF2-40B4-BE49-F238E27FC236}">
+                <a16:creationId xmlns:a16="http://schemas.microsoft.com/office/drawing/2014/main" id="{23563A7B-144F-CF05-F95F-A2541B8AFB1C}"/>
+              </a:ext>
+            </a:extLst>
+          </p:cNvPr>
+          <p:cNvSpPr/>
+          <p:nvPr/>
+        </p:nvSpPr>
+        <p:spPr>
+          <a:xfrm rot="20112910">
+            <a:off x="2682787" y="3260176"/>
+            <a:ext cx="1594185" cy="673768"/>
+          </a:xfrm>
+          <a:prstGeom prst="rightArrow">
+            <a:avLst/>
+          </a:prstGeom>
+          <a:solidFill>
+            <a:srgbClr val="C00000"/>
+          </a:solidFill>
+        </p:spPr>
+        <p:style>
+          <a:lnRef idx="2">
+            <a:schemeClr val="accent1">
+              <a:shade val="15000"/>
+            </a:schemeClr>
+          </a:lnRef>
+          <a:fillRef idx="1">
+            <a:schemeClr val="accent1"/>
+          </a:fillRef>
+          <a:effectRef idx="0">
+            <a:schemeClr val="accent1"/>
+          </a:effectRef>
+          <a:fontRef idx="minor">
+            <a:schemeClr val="lt1"/>
+          </a:fontRef>
+        </p:style>
+        <p:txBody>
+          <a:bodyPr rtlCol="0" anchor="ctr"/>
+          <a:lstStyle/>
+          <a:p>
+            <a:pPr algn="ctr"/>
+            <a:endParaRPr lang="fr-FR"/>
+          </a:p>
+        </p:txBody>
+      </p:sp>
     </p:spTree>
     <p:extLst>
       <p:ext uri="{BB962C8B-B14F-4D97-AF65-F5344CB8AC3E}">
@@ -7989,7 +8602,7 @@
           <a:p>
             <a:r>
               <a:rPr lang="fr-FR" dirty="0"/>
-              <a:t>Stack </a:t>
+              <a:t>Google et Stack </a:t>
             </a:r>
             <a:r>
               <a:rPr lang="fr-FR" dirty="0" err="1"/>
@@ -7997,7 +8610,13 @@
             </a:r>
             <a:r>
               <a:rPr lang="fr-FR" dirty="0"/>
-              <a:t> est aussi ton ami </a:t>
+              <a:t> sont tes meilleurs amis</a:t>
+            </a:r>
+          </a:p>
+          <a:p>
+            <a:r>
+              <a:rPr lang="fr-FR" dirty="0"/>
+              <a:t>Recherches en Anglais </a:t>
             </a:r>
           </a:p>
           <a:p>
@@ -8022,15 +8641,7 @@
           <a:p>
             <a:r>
               <a:rPr lang="fr-FR" dirty="0"/>
-              <a:t>Au début ne perd pas trop de temps sur </a:t>
-            </a:r>
-            <a:r>
-              <a:rPr lang="fr-FR"/>
-              <a:t>la "beauté" </a:t>
-            </a:r>
-            <a:r>
-              <a:rPr lang="fr-FR" dirty="0"/>
-              <a:t>des graphes</a:t>
+              <a:t>Au début ne perd pas trop de temps sur la "beauté" des graphes</a:t>
             </a:r>
           </a:p>
           <a:p>
@@ -11252,16 +11863,6 @@
           <a:p>
             <a:pPr lvl="1"/>
             <a:r>
-              <a:rPr lang="en-US" sz="1600" dirty="0">
-                <a:solidFill>
-                  <a:srgbClr val="0F1111"/>
-                </a:solidFill>
-                <a:latin typeface="Courier New" panose="02070309020205020404" pitchFamily="49" charset="0"/>
-                <a:cs typeface="Courier New" panose="02070309020205020404" pitchFamily="49" charset="0"/>
-              </a:rPr>
-              <a:t>Je </a:t>
-            </a:r>
-            <a:r>
               <a:rPr lang="en-US" sz="1600" dirty="0" err="1">
                 <a:solidFill>
                   <a:srgbClr val="0F1111"/>
@@ -11269,47 +11870,7 @@
                 <a:latin typeface="Courier New" panose="02070309020205020404" pitchFamily="49" charset="0"/>
                 <a:cs typeface="Courier New" panose="02070309020205020404" pitchFamily="49" charset="0"/>
               </a:rPr>
-              <a:t>crois</a:t>
-            </a:r>
-            <a:r>
-              <a:rPr lang="en-US" sz="1600" dirty="0">
-                <a:solidFill>
-                  <a:srgbClr val="0F1111"/>
-                </a:solidFill>
-                <a:latin typeface="Courier New" panose="02070309020205020404" pitchFamily="49" charset="0"/>
-                <a:cs typeface="Courier New" panose="02070309020205020404" pitchFamily="49" charset="0"/>
-              </a:rPr>
-              <a:t> </a:t>
-            </a:r>
-            <a:r>
-              <a:rPr lang="en-US" sz="1600" dirty="0" err="1">
-                <a:solidFill>
-                  <a:srgbClr val="0F1111"/>
-                </a:solidFill>
-                <a:latin typeface="Courier New" panose="02070309020205020404" pitchFamily="49" charset="0"/>
-                <a:cs typeface="Courier New" panose="02070309020205020404" pitchFamily="49" charset="0"/>
-              </a:rPr>
-              <a:t>qu’il</a:t>
-            </a:r>
-            <a:r>
-              <a:rPr lang="en-US" sz="1600" dirty="0">
-                <a:solidFill>
-                  <a:srgbClr val="0F1111"/>
-                </a:solidFill>
-                <a:latin typeface="Courier New" panose="02070309020205020404" pitchFamily="49" charset="0"/>
-                <a:cs typeface="Courier New" panose="02070309020205020404" pitchFamily="49" charset="0"/>
-              </a:rPr>
-              <a:t> </a:t>
-            </a:r>
-            <a:r>
-              <a:rPr lang="en-US" sz="1600" dirty="0" err="1">
-                <a:solidFill>
-                  <a:srgbClr val="0F1111"/>
-                </a:solidFill>
-                <a:latin typeface="Courier New" panose="02070309020205020404" pitchFamily="49" charset="0"/>
-                <a:cs typeface="Courier New" panose="02070309020205020404" pitchFamily="49" charset="0"/>
-              </a:rPr>
-              <a:t>existe</a:t>
+              <a:t>Existe</a:t>
             </a:r>
             <a:r>
               <a:rPr lang="en-US" sz="1600" dirty="0">
@@ -11372,6 +11933,63 @@
           <a:p>
             <a:r>
               <a:rPr lang="en-US" dirty="0"/>
+              <a:t>Python Crash Course</a:t>
+            </a:r>
+          </a:p>
+          <a:p>
+            <a:pPr lvl="1"/>
+            <a:r>
+              <a:rPr lang="en-US" sz="1600" dirty="0">
+                <a:solidFill>
+                  <a:srgbClr val="0F1111"/>
+                </a:solidFill>
+                <a:latin typeface="Courier New" panose="02070309020205020404" pitchFamily="49" charset="0"/>
+                <a:cs typeface="Courier New" panose="02070309020205020404" pitchFamily="49" charset="0"/>
+              </a:rPr>
+              <a:t>3eme Edition, 2023, 1.5 M </a:t>
+            </a:r>
+            <a:r>
+              <a:rPr lang="en-US" sz="1600" dirty="0" err="1">
+                <a:solidFill>
+                  <a:srgbClr val="0F1111"/>
+                </a:solidFill>
+                <a:latin typeface="Courier New" panose="02070309020205020404" pitchFamily="49" charset="0"/>
+                <a:cs typeface="Courier New" panose="02070309020205020404" pitchFamily="49" charset="0"/>
+              </a:rPr>
+              <a:t>d’exemplaires</a:t>
+            </a:r>
+            <a:endParaRPr lang="en-US" sz="1600" dirty="0">
+              <a:solidFill>
+                <a:srgbClr val="0F1111"/>
+              </a:solidFill>
+              <a:latin typeface="Courier New" panose="02070309020205020404" pitchFamily="49" charset="0"/>
+              <a:cs typeface="Courier New" panose="02070309020205020404" pitchFamily="49" charset="0"/>
+            </a:endParaRPr>
+          </a:p>
+          <a:p>
+            <a:pPr lvl="1"/>
+            <a:r>
+              <a:rPr lang="en-US" sz="1600" dirty="0">
+                <a:solidFill>
+                  <a:srgbClr val="0F1111"/>
+                </a:solidFill>
+                <a:latin typeface="Courier New" panose="02070309020205020404" pitchFamily="49" charset="0"/>
+                <a:cs typeface="Courier New" panose="02070309020205020404" pitchFamily="49" charset="0"/>
+                <a:hlinkClick r:id="rId4"/>
+              </a:rPr>
+              <a:t>https://amzn.eu/d/3DLax8n</a:t>
+            </a:r>
+            <a:endParaRPr lang="en-US" sz="1600" dirty="0">
+              <a:solidFill>
+                <a:srgbClr val="0F1111"/>
+              </a:solidFill>
+              <a:latin typeface="Courier New" panose="02070309020205020404" pitchFamily="49" charset="0"/>
+              <a:cs typeface="Courier New" panose="02070309020205020404" pitchFamily="49" charset="0"/>
+            </a:endParaRPr>
+          </a:p>
+          <a:p>
+            <a:r>
+              <a:rPr lang="en-US" dirty="0"/>
               <a:t>Hands-on Machine Learning With Scikit-learn, </a:t>
             </a:r>
             <a:r>
@@ -11460,68 +12078,11 @@
                 </a:solidFill>
                 <a:latin typeface="Courier New" panose="02070309020205020404" pitchFamily="49" charset="0"/>
                 <a:cs typeface="Courier New" panose="02070309020205020404" pitchFamily="49" charset="0"/>
-                <a:hlinkClick r:id="rId4"/>
+                <a:hlinkClick r:id="rId5"/>
               </a:rPr>
               <a:t>https://amzn.eu/d/egtdtcd</a:t>
             </a:r>
-            <a:endParaRPr lang="en-US" sz="1600" dirty="0">
-              <a:solidFill>
-                <a:srgbClr val="0F1111"/>
-              </a:solidFill>
-              <a:latin typeface="Courier New" panose="02070309020205020404" pitchFamily="49" charset="0"/>
-              <a:cs typeface="Courier New" panose="02070309020205020404" pitchFamily="49" charset="0"/>
-            </a:endParaRPr>
-          </a:p>
-          <a:p>
-            <a:r>
-              <a:rPr lang="en-US" dirty="0"/>
-              <a:t>Python Crash Course</a:t>
-            </a:r>
-          </a:p>
-          <a:p>
-            <a:pPr lvl="1"/>
-            <a:r>
-              <a:rPr lang="en-US" sz="1600" dirty="0">
-                <a:solidFill>
-                  <a:srgbClr val="0F1111"/>
-                </a:solidFill>
-                <a:latin typeface="Courier New" panose="02070309020205020404" pitchFamily="49" charset="0"/>
-                <a:cs typeface="Courier New" panose="02070309020205020404" pitchFamily="49" charset="0"/>
-              </a:rPr>
-              <a:t>3eme Edition, 2023, 1.5 M </a:t>
-            </a:r>
-            <a:r>
-              <a:rPr lang="en-US" sz="1600" dirty="0" err="1">
-                <a:solidFill>
-                  <a:srgbClr val="0F1111"/>
-                </a:solidFill>
-                <a:latin typeface="Courier New" panose="02070309020205020404" pitchFamily="49" charset="0"/>
-                <a:cs typeface="Courier New" panose="02070309020205020404" pitchFamily="49" charset="0"/>
-              </a:rPr>
-              <a:t>d’exemplaires</a:t>
-            </a:r>
-            <a:endParaRPr lang="en-US" sz="1600" dirty="0">
-              <a:solidFill>
-                <a:srgbClr val="0F1111"/>
-              </a:solidFill>
-              <a:latin typeface="Courier New" panose="02070309020205020404" pitchFamily="49" charset="0"/>
-              <a:cs typeface="Courier New" panose="02070309020205020404" pitchFamily="49" charset="0"/>
-            </a:endParaRPr>
-          </a:p>
-          <a:p>
-            <a:pPr lvl="1"/>
-            <a:r>
-              <a:rPr lang="en-US" sz="1600" dirty="0">
-                <a:solidFill>
-                  <a:srgbClr val="0F1111"/>
-                </a:solidFill>
-                <a:latin typeface="Courier New" panose="02070309020205020404" pitchFamily="49" charset="0"/>
-                <a:cs typeface="Courier New" panose="02070309020205020404" pitchFamily="49" charset="0"/>
-                <a:hlinkClick r:id="rId5"/>
-              </a:rPr>
-              <a:t>https://amzn.eu/d/3DLax8n</a:t>
-            </a:r>
-            <a:endParaRPr lang="en-US" sz="1600" dirty="0">
+            <a:endParaRPr lang="en-US" sz="2000" dirty="0">
               <a:solidFill>
                 <a:srgbClr val="0F1111"/>
               </a:solidFill>
@@ -11651,7 +12212,7 @@
           <p:nvPr/>
         </p:nvPicPr>
         <p:blipFill rotWithShape="1">
-          <a:blip r:embed="rId2"/>
+          <a:blip r:embed="rId3"/>
           <a:srcRect r="12822"/>
           <a:stretch/>
         </p:blipFill>
@@ -11729,27 +12290,48 @@
         </p:spPr>
         <p:txBody>
           <a:bodyPr>
-            <a:normAutofit fontScale="92500" lnSpcReduction="10000"/>
+            <a:normAutofit fontScale="85000" lnSpcReduction="20000"/>
           </a:bodyPr>
           <a:lstStyle/>
           <a:p>
             <a:r>
               <a:rPr lang="en-US" dirty="0"/>
-              <a:t>Precision (exactitude) des predictions positives :</a:t>
+              <a:t>Precision :</a:t>
             </a:r>
           </a:p>
           <a:p>
             <a:pPr lvl="1"/>
             <a:r>
               <a:rPr lang="en-US" dirty="0"/>
-              <a:t> TP/(TP+FP)</a:t>
-            </a:r>
+              <a:t>Point de </a:t>
+            </a:r>
+            <a:r>
+              <a:rPr lang="en-US" dirty="0" err="1"/>
+              <a:t>vue</a:t>
+            </a:r>
+            <a:r>
+              <a:rPr lang="en-US" dirty="0"/>
+              <a:t> des </a:t>
+            </a:r>
+            <a:r>
+              <a:rPr lang="en-US" dirty="0" err="1"/>
+              <a:t>prédictions</a:t>
+            </a:r>
+            <a:endParaRPr lang="en-US" dirty="0"/>
           </a:p>
           <a:p>
             <a:pPr lvl="1"/>
             <a:r>
               <a:rPr lang="en-US" dirty="0"/>
-              <a:t>De tout </a:t>
+              <a:t>De </a:t>
+            </a:r>
+            <a:r>
+              <a:rPr lang="en-US" dirty="0" err="1"/>
+              <a:t>tous</a:t>
+            </a:r>
+            <a:r>
+              <a:rPr lang="en-US" dirty="0"/>
+              <a:t> </a:t>
             </a:r>
             <a:r>
               <a:rPr lang="en-US" dirty="0" err="1"/>
@@ -11757,6 +12339,105 @@
             </a:r>
             <a:r>
               <a:rPr lang="en-US" dirty="0"/>
+              <a:t> à qui on a </a:t>
+            </a:r>
+            <a:r>
+              <a:rPr lang="en-US" dirty="0" err="1"/>
+              <a:t>prédit</a:t>
+            </a:r>
+            <a:r>
+              <a:rPr lang="en-US" dirty="0"/>
+              <a:t> le cancer </a:t>
+            </a:r>
+            <a:r>
+              <a:rPr lang="en-US" dirty="0" err="1"/>
+              <a:t>combien</a:t>
+            </a:r>
+            <a:r>
+              <a:rPr lang="en-US" dirty="0"/>
+              <a:t> </a:t>
+            </a:r>
+            <a:r>
+              <a:rPr lang="en-US" dirty="0" err="1"/>
+              <a:t>l'ont</a:t>
+            </a:r>
+            <a:r>
+              <a:rPr lang="en-US" dirty="0"/>
+              <a:t> </a:t>
+            </a:r>
+            <a:r>
+              <a:rPr lang="en-US" dirty="0" err="1"/>
+              <a:t>réellement</a:t>
+            </a:r>
+            <a:r>
+              <a:rPr lang="en-US" dirty="0"/>
+              <a:t>? </a:t>
+            </a:r>
+          </a:p>
+          <a:p>
+            <a:pPr lvl="1"/>
+            <a:r>
+              <a:rPr lang="en-US" dirty="0"/>
+              <a:t>TP/(TP+FP) : </a:t>
+            </a:r>
+            <a:r>
+              <a:rPr lang="fr-FR" dirty="0"/>
+              <a:t>Right </a:t>
+            </a:r>
+            <a:r>
+              <a:rPr lang="en-US" dirty="0"/>
+              <a:t>col</a:t>
+            </a:r>
+          </a:p>
+          <a:p>
+            <a:r>
+              <a:rPr lang="en-US" dirty="0"/>
+              <a:t>Recall (rappel, </a:t>
+            </a:r>
+            <a:r>
+              <a:rPr lang="en-US" dirty="0" err="1"/>
+              <a:t>sensibilité</a:t>
+            </a:r>
+            <a:r>
+              <a:rPr lang="en-US" dirty="0"/>
+              <a:t>, True Positive Rate) : </a:t>
+            </a:r>
+          </a:p>
+          <a:p>
+            <a:pPr lvl="1"/>
+            <a:r>
+              <a:rPr lang="en-US" dirty="0"/>
+              <a:t>Point de </a:t>
+            </a:r>
+            <a:r>
+              <a:rPr lang="en-US" dirty="0" err="1"/>
+              <a:t>vue</a:t>
+            </a:r>
+            <a:r>
+              <a:rPr lang="en-US" dirty="0"/>
+              <a:t> des observations</a:t>
+            </a:r>
+          </a:p>
+          <a:p>
+            <a:pPr lvl="1"/>
+            <a:r>
+              <a:rPr lang="en-US" dirty="0"/>
+              <a:t>De </a:t>
+            </a:r>
+            <a:r>
+              <a:rPr lang="en-US" dirty="0" err="1"/>
+              <a:t>tous</a:t>
+            </a:r>
+            <a:r>
+              <a:rPr lang="en-US" dirty="0"/>
+              <a:t> </a:t>
+            </a:r>
+            <a:r>
+              <a:rPr lang="en-US" dirty="0" err="1"/>
+              <a:t>ceux</a:t>
+            </a:r>
+            <a:r>
+              <a:rPr lang="en-US" dirty="0"/>
               <a:t> </a:t>
             </a:r>
             <a:r>
@@ -11765,11 +12446,11 @@
             </a:r>
             <a:r>
               <a:rPr lang="en-US" dirty="0"/>
-              <a:t> a </a:t>
+              <a:t> observe </a:t>
             </a:r>
             <a:r>
               <a:rPr lang="en-US" dirty="0" err="1"/>
-              <a:t>prédit</a:t>
+              <a:t>comme</a:t>
             </a:r>
             <a:r>
               <a:rPr lang="en-US" dirty="0"/>
@@ -11777,7 +12458,15 @@
             </a:r>
             <a:r>
               <a:rPr lang="en-US" dirty="0" err="1"/>
-              <a:t>comme</a:t>
+              <a:t>cancéreux</a:t>
+            </a:r>
+            <a:r>
+              <a:rPr lang="en-US" dirty="0"/>
+              <a:t>, </a:t>
+            </a:r>
+            <a:r>
+              <a:rPr lang="en-US" dirty="0" err="1"/>
+              <a:t>combien</a:t>
             </a:r>
             <a:r>
               <a:rPr lang="en-US" dirty="0"/>
@@ -11785,15 +12474,7 @@
             </a:r>
             <a:r>
               <a:rPr lang="en-US" dirty="0" err="1"/>
-              <a:t>ayant</a:t>
-            </a:r>
-            <a:r>
-              <a:rPr lang="en-US" dirty="0"/>
-              <a:t> le cancer </a:t>
-            </a:r>
-            <a:r>
-              <a:rPr lang="en-US" dirty="0" err="1"/>
-              <a:t>combien</a:t>
+              <a:t>ont</a:t>
             </a:r>
             <a:r>
               <a:rPr lang="en-US" dirty="0"/>
@@ -11801,99 +12482,26 @@
             </a:r>
             <a:r>
               <a:rPr lang="en-US" dirty="0" err="1"/>
-              <a:t>ont</a:t>
+              <a:t>été</a:t>
             </a:r>
             <a:r>
               <a:rPr lang="en-US" dirty="0"/>
-              <a:t> </a:t>
+              <a:t> bien </a:t>
             </a:r>
             <a:r>
               <a:rPr lang="en-US" dirty="0" err="1"/>
-              <a:t>réellement</a:t>
+              <a:t>classé</a:t>
             </a:r>
             <a:r>
               <a:rPr lang="en-US" dirty="0"/>
-              <a:t> le cancer. Spam. </a:t>
-            </a:r>
-            <a:r>
-              <a:rPr lang="fr-FR" dirty="0"/>
-              <a:t>Right </a:t>
-            </a:r>
+              <a:t>?</a:t>
+            </a:r>
+          </a:p>
+          <a:p>
+            <a:pPr lvl="1"/>
             <a:r>
               <a:rPr lang="en-US" dirty="0"/>
-              <a:t>col </a:t>
-            </a:r>
-          </a:p>
-          <a:p>
-            <a:r>
-              <a:rPr lang="en-US" dirty="0"/>
-              <a:t>Recall (rappel, </a:t>
-            </a:r>
-            <a:r>
-              <a:rPr lang="en-US" dirty="0" err="1"/>
-              <a:t>sensibilité</a:t>
-            </a:r>
-            <a:r>
-              <a:rPr lang="en-US" dirty="0"/>
-              <a:t>) – True Positive Rate : </a:t>
-            </a:r>
-          </a:p>
-          <a:p>
-            <a:pPr lvl="1"/>
-            <a:r>
-              <a:rPr lang="en-US" dirty="0"/>
-              <a:t>TP/(TP+FN)</a:t>
-            </a:r>
-          </a:p>
-          <a:p>
-            <a:pPr lvl="1"/>
-            <a:r>
-              <a:rPr lang="en-US" dirty="0" err="1"/>
-              <a:t>Taux</a:t>
-            </a:r>
-            <a:r>
-              <a:rPr lang="en-US" dirty="0"/>
-              <a:t> </a:t>
-            </a:r>
-            <a:r>
-              <a:rPr lang="en-US" dirty="0" err="1"/>
-              <a:t>d'observations</a:t>
-            </a:r>
-            <a:r>
-              <a:rPr lang="en-US" dirty="0"/>
-              <a:t> positives </a:t>
-            </a:r>
-            <a:r>
-              <a:rPr lang="en-US" dirty="0" err="1"/>
-              <a:t>ayant</a:t>
-            </a:r>
-            <a:r>
-              <a:rPr lang="en-US" dirty="0"/>
-              <a:t> </a:t>
-            </a:r>
-            <a:r>
-              <a:rPr lang="en-US" dirty="0" err="1"/>
-              <a:t>été</a:t>
-            </a:r>
-            <a:r>
-              <a:rPr lang="en-US" dirty="0"/>
-              <a:t> </a:t>
-            </a:r>
-            <a:r>
-              <a:rPr lang="en-US" dirty="0" err="1"/>
-              <a:t>correctement</a:t>
-            </a:r>
-            <a:r>
-              <a:rPr lang="en-US" dirty="0"/>
-              <a:t> </a:t>
-            </a:r>
-            <a:r>
-              <a:rPr lang="en-US" dirty="0" err="1"/>
-              <a:t>détectées</a:t>
-            </a:r>
-            <a:r>
-              <a:rPr lang="en-US" dirty="0"/>
-              <a:t>. Medicine. Bottom line</a:t>
+              <a:t>TP/(TP+FN) : Bottom line</a:t>
             </a:r>
           </a:p>
           <a:p>
@@ -12103,7 +12711,7 @@
       </p:sp>
       <p:sp>
         <p:nvSpPr>
-          <p:cNvPr id="11" name="Flèche : gauche 10">
+          <p:cNvPr id="11" name="Flèche : droite 10">
             <a:extLst>
               <a:ext uri="{FF2B5EF4-FFF2-40B4-BE49-F238E27FC236}">
                 <a16:creationId xmlns:a16="http://schemas.microsoft.com/office/drawing/2014/main" id="{45B9CAB5-DFCC-48F4-759E-E1EEC02148C6}"/>
@@ -12115,10 +12723,10 @@
         </p:nvSpPr>
         <p:spPr>
           <a:xfrm>
-            <a:off x="9188878" y="5154552"/>
+            <a:off x="9071115" y="4945594"/>
             <a:ext cx="2462709" cy="415126"/>
           </a:xfrm>
-          <a:prstGeom prst="leftArrow">
+          <a:prstGeom prst="rightArrow">
             <a:avLst/>
           </a:prstGeom>
           <a:ln>
@@ -12168,8 +12776,8 @@
         </p:nvSpPr>
         <p:spPr>
           <a:xfrm>
-            <a:off x="11651587" y="2945154"/>
-            <a:ext cx="448785" cy="1905359"/>
+            <a:off x="11651587" y="2445328"/>
+            <a:ext cx="448785" cy="2405186"/>
           </a:xfrm>
           <a:prstGeom prst="upArrow">
             <a:avLst/>
@@ -12201,6 +12809,49 @@
               <a:t>Precision</a:t>
             </a:r>
             <a:endParaRPr lang="fr-FR" sz="1400" dirty="0"/>
+          </a:p>
+        </p:txBody>
+      </p:sp>
+      <p:sp>
+        <p:nvSpPr>
+          <p:cNvPr id="12" name="ZoneTexte 11">
+            <a:extLst>
+              <a:ext uri="{FF2B5EF4-FFF2-40B4-BE49-F238E27FC236}">
+                <a16:creationId xmlns:a16="http://schemas.microsoft.com/office/drawing/2014/main" id="{620BC2E6-F7F1-762D-A243-2656FBC57365}"/>
+              </a:ext>
+            </a:extLst>
+          </p:cNvPr>
+          <p:cNvSpPr txBox="1"/>
+          <p:nvPr/>
+        </p:nvSpPr>
+        <p:spPr>
+          <a:xfrm>
+            <a:off x="9071116" y="5507972"/>
+            <a:ext cx="2580472" cy="523220"/>
+          </a:xfrm>
+          <a:prstGeom prst="rect">
+            <a:avLst/>
+          </a:prstGeom>
+          <a:noFill/>
+          <a:ln>
+            <a:solidFill>
+              <a:schemeClr val="tx1"/>
+            </a:solidFill>
+          </a:ln>
+        </p:spPr>
+        <p:txBody>
+          <a:bodyPr wrap="square" rtlCol="0">
+            <a:spAutoFit/>
+          </a:bodyPr>
+          <a:lstStyle/>
+          <a:p>
+            <a:r>
+              <a:rPr lang="fr-FR" sz="1400" dirty="0">
+                <a:latin typeface="Times New Roman" panose="02020603050405020304" pitchFamily="18" charset="0"/>
+                <a:cs typeface="Times New Roman" panose="02020603050405020304" pitchFamily="18" charset="0"/>
+              </a:rPr>
+              <a:t>Depuis l'extérieur, regarde la ligne ou la colonne du 1</a:t>
+            </a:r>
           </a:p>
         </p:txBody>
       </p:sp>
@@ -12762,10 +13413,10 @@
       </p:grpSpPr>
       <p:sp>
         <p:nvSpPr>
-          <p:cNvPr id="2" name="Titre 1">
-            <a:extLst>
-              <a:ext uri="{FF2B5EF4-FFF2-40B4-BE49-F238E27FC236}">
-                <a16:creationId xmlns:a16="http://schemas.microsoft.com/office/drawing/2014/main" id="{FA6243E6-E350-4836-3E9F-D3814475FD2C}"/>
+          <p:cNvPr id="4" name="Titre 3">
+            <a:extLst>
+              <a:ext uri="{FF2B5EF4-FFF2-40B4-BE49-F238E27FC236}">
+                <a16:creationId xmlns:a16="http://schemas.microsoft.com/office/drawing/2014/main" id="{E0EF6534-E2A9-B8D6-2479-C32AFD155124}"/>
               </a:ext>
             </a:extLst>
           </p:cNvPr>
@@ -12783,17 +13434,17 @@
           <a:p>
             <a:r>
               <a:rPr lang="fr-FR" dirty="0"/>
-              <a:t>Jour 9 - Projet</a:t>
-            </a:r>
-          </a:p>
-        </p:txBody>
-      </p:sp>
-      <p:sp>
-        <p:nvSpPr>
-          <p:cNvPr id="4" name="Espace réservé du texte 3">
-            <a:extLst>
-              <a:ext uri="{FF2B5EF4-FFF2-40B4-BE49-F238E27FC236}">
-                <a16:creationId xmlns:a16="http://schemas.microsoft.com/office/drawing/2014/main" id="{24E22D90-D352-DD92-3A88-32EB8E2D63FA}"/>
+              <a:t>Rétro planning</a:t>
+            </a:r>
+          </a:p>
+        </p:txBody>
+      </p:sp>
+      <p:sp>
+        <p:nvSpPr>
+          <p:cNvPr id="5" name="Espace réservé du contenu 4">
+            <a:extLst>
+              <a:ext uri="{FF2B5EF4-FFF2-40B4-BE49-F238E27FC236}">
+                <a16:creationId xmlns:a16="http://schemas.microsoft.com/office/drawing/2014/main" id="{E7243C4C-A2DA-48C8-744A-8AB1E7248236}"/>
               </a:ext>
             </a:extLst>
           </p:cNvPr>
@@ -12801,22 +13452,66 @@
             <a:spLocks noGrp="1"/>
           </p:cNvSpPr>
           <p:nvPr>
-            <p:ph type="body" idx="1"/>
+            <p:ph idx="1"/>
           </p:nvPr>
         </p:nvSpPr>
         <p:spPr/>
         <p:txBody>
-          <a:bodyPr/>
-          <a:lstStyle/>
-          <a:p>
-            <a:endParaRPr lang="fr-FR"/>
+          <a:bodyPr>
+            <a:normAutofit/>
+          </a:bodyPr>
+          <a:lstStyle/>
+          <a:p>
+            <a:r>
+              <a:rPr lang="fr-FR" dirty="0"/>
+              <a:t>Présentations Vendredi après-midi</a:t>
+            </a:r>
+          </a:p>
+          <a:p>
+            <a:r>
+              <a:rPr lang="fr-FR" dirty="0"/>
+              <a:t>=&gt; Répétitions Vendredi entre 12 et 14H</a:t>
+            </a:r>
+          </a:p>
+          <a:p>
+            <a:r>
+              <a:rPr lang="fr-FR" dirty="0"/>
+              <a:t>=&gt; Slides terminés, relus etc. à 12H</a:t>
+            </a:r>
+          </a:p>
+          <a:p>
+            <a:r>
+              <a:rPr lang="fr-FR" dirty="0"/>
+              <a:t>=&gt; Jeudi soir tous les graphes, scores, conclusions sont sortis</a:t>
+            </a:r>
+          </a:p>
+          <a:p>
+            <a:pPr lvl="1"/>
+            <a:r>
+              <a:rPr lang="fr-FR" dirty="0"/>
+              <a:t>Vendredi matin on pourra sortir 1 ou 2 trucs mais pas beaucoup plus</a:t>
+            </a:r>
+          </a:p>
+          <a:p>
+            <a:r>
+              <a:rPr lang="fr-FR" dirty="0"/>
+              <a:t>=&gt; Cherchez des </a:t>
+            </a:r>
+            <a:r>
+              <a:rPr lang="fr-FR" dirty="0" err="1"/>
+              <a:t>datasets</a:t>
+            </a:r>
+            <a:r>
+              <a:rPr lang="fr-FR" dirty="0"/>
+              <a:t> et des idées de sujet le week-end précédent</a:t>
+            </a:r>
           </a:p>
         </p:txBody>
       </p:sp>
     </p:spTree>
     <p:extLst>
       <p:ext uri="{BB962C8B-B14F-4D97-AF65-F5344CB8AC3E}">
-        <p14:creationId xmlns:p14="http://schemas.microsoft.com/office/powerpoint/2010/main" val="80189523"/>
+        <p14:creationId xmlns:p14="http://schemas.microsoft.com/office/powerpoint/2010/main" val="2196411414"/>
       </p:ext>
     </p:extLst>
   </p:cSld>
@@ -12848,7 +13543,7 @@
           <p:cNvPr id="2" name="Titre 1">
             <a:extLst>
               <a:ext uri="{FF2B5EF4-FFF2-40B4-BE49-F238E27FC236}">
-                <a16:creationId xmlns:a16="http://schemas.microsoft.com/office/drawing/2014/main" id="{FA6243E6-E350-4836-3E9F-D3814475FD2C}"/>
+                <a16:creationId xmlns:a16="http://schemas.microsoft.com/office/drawing/2014/main" id="{91D577C0-85A9-8612-8D5E-F221D19DDEA3}"/>
               </a:ext>
             </a:extLst>
           </p:cNvPr>
@@ -12865,12 +13560,193 @@
           <a:lstStyle/>
           <a:p>
             <a:r>
-              <a:rPr lang="fr-FR"/>
-              <a:t>Jour 10 </a:t>
-            </a:r>
-            <a:r>
-              <a:rPr lang="fr-FR" dirty="0"/>
-              <a:t>- Présentations</a:t>
+              <a:rPr lang="fr-FR" dirty="0"/>
+              <a:t>Conduite du projet</a:t>
+            </a:r>
+          </a:p>
+        </p:txBody>
+      </p:sp>
+      <p:sp>
+        <p:nvSpPr>
+          <p:cNvPr id="3" name="Espace réservé du contenu 2">
+            <a:extLst>
+              <a:ext uri="{FF2B5EF4-FFF2-40B4-BE49-F238E27FC236}">
+                <a16:creationId xmlns:a16="http://schemas.microsoft.com/office/drawing/2014/main" id="{EB0FC026-327D-475F-13A4-A3A9BB6066E7}"/>
+              </a:ext>
+            </a:extLst>
+          </p:cNvPr>
+          <p:cNvSpPr>
+            <a:spLocks noGrp="1"/>
+          </p:cNvSpPr>
+          <p:nvPr>
+            <p:ph idx="1"/>
+          </p:nvPr>
+        </p:nvSpPr>
+        <p:spPr/>
+        <p:txBody>
+          <a:bodyPr>
+            <a:normAutofit fontScale="92500"/>
+          </a:bodyPr>
+          <a:lstStyle/>
+          <a:p>
+            <a:r>
+              <a:rPr lang="fr-FR" dirty="0"/>
+              <a:t>Ce n'est pas un concours, c'est une validation des acquis</a:t>
+            </a:r>
+          </a:p>
+          <a:p>
+            <a:pPr lvl="1"/>
+            <a:r>
+              <a:rPr lang="fr-FR" dirty="0"/>
+              <a:t>Montrez que vous savez appliquer ce que vous avez appris</a:t>
+            </a:r>
+          </a:p>
+          <a:p>
+            <a:pPr lvl="1"/>
+            <a:r>
+              <a:rPr lang="fr-FR" dirty="0"/>
+              <a:t>Vous êtes là pour prouver, pas pour trouver</a:t>
+            </a:r>
+          </a:p>
+          <a:p>
+            <a:r>
+              <a:rPr lang="fr-FR" dirty="0" err="1"/>
+              <a:t>Dataset</a:t>
+            </a:r>
+            <a:endParaRPr lang="fr-FR" dirty="0"/>
+          </a:p>
+          <a:p>
+            <a:pPr lvl="1"/>
+            <a:r>
+              <a:rPr lang="fr-FR" dirty="0"/>
+              <a:t>Il vaut mieux un excellent </a:t>
+            </a:r>
+            <a:r>
+              <a:rPr lang="fr-FR" dirty="0" err="1"/>
+              <a:t>dataset</a:t>
+            </a:r>
+            <a:r>
+              <a:rPr lang="fr-FR" dirty="0"/>
+              <a:t> sur un sujet "moyen"</a:t>
+            </a:r>
+          </a:p>
+          <a:p>
+            <a:pPr lvl="1"/>
+            <a:r>
+              <a:rPr lang="fr-FR" dirty="0"/>
+              <a:t>Plutôt qu'un "formidable" sujet mais aucune donnée à traiter</a:t>
+            </a:r>
+          </a:p>
+          <a:p>
+            <a:pPr lvl="1"/>
+            <a:r>
+              <a:rPr lang="fr-FR" dirty="0"/>
+              <a:t>Garbage in =&gt; Garbage Out</a:t>
+            </a:r>
+          </a:p>
+          <a:p>
+            <a:r>
+              <a:rPr lang="fr-FR" dirty="0" err="1"/>
+              <a:t>Dataset</a:t>
+            </a:r>
+            <a:endParaRPr lang="fr-FR" dirty="0"/>
+          </a:p>
+          <a:p>
+            <a:pPr lvl="1"/>
+            <a:r>
+              <a:rPr lang="fr-FR" dirty="0"/>
+              <a:t>Vous allez passer 2/3 du temps sur les </a:t>
+            </a:r>
+            <a:r>
+              <a:rPr lang="fr-FR" dirty="0" err="1"/>
+              <a:t>datasets</a:t>
+            </a:r>
+            <a:r>
+              <a:rPr lang="fr-FR" dirty="0"/>
+              <a:t>, l'EDA</a:t>
+            </a:r>
+          </a:p>
+          <a:p>
+            <a:pPr lvl="1"/>
+            <a:r>
+              <a:rPr lang="fr-FR" dirty="0"/>
+              <a:t>Faire tourner des modèles c'est facile et rapide</a:t>
+            </a:r>
+          </a:p>
+          <a:p>
+            <a:pPr lvl="1"/>
+            <a:r>
+              <a:rPr lang="fr-FR" dirty="0"/>
+              <a:t>Si les données sont trop pourries changez de </a:t>
+            </a:r>
+            <a:r>
+              <a:rPr lang="fr-FR" dirty="0" err="1"/>
+              <a:t>dataset</a:t>
+            </a:r>
+            <a:r>
+              <a:rPr lang="fr-FR" dirty="0"/>
+              <a:t> . Quitte à changer de sujet</a:t>
+            </a:r>
+          </a:p>
+          <a:p>
+            <a:endParaRPr lang="fr-FR" dirty="0"/>
+          </a:p>
+        </p:txBody>
+      </p:sp>
+    </p:spTree>
+    <p:extLst>
+      <p:ext uri="{BB962C8B-B14F-4D97-AF65-F5344CB8AC3E}">
+        <p14:creationId xmlns:p14="http://schemas.microsoft.com/office/powerpoint/2010/main" val="2540323896"/>
+      </p:ext>
+    </p:extLst>
+  </p:cSld>
+  <p:clrMapOvr>
+    <a:masterClrMapping/>
+  </p:clrMapOvr>
+</p:sld>
+</file>
+
+<file path=ppt/slides/slide35.xml><?xml version="1.0" encoding="utf-8"?>
+<p:sld xmlns:a="http://schemas.openxmlformats.org/drawingml/2006/main" xmlns:r="http://schemas.openxmlformats.org/officeDocument/2006/relationships" xmlns:p="http://schemas.openxmlformats.org/presentationml/2006/main">
+  <p:cSld>
+    <p:spTree>
+      <p:nvGrpSpPr>
+        <p:cNvPr id="1" name=""/>
+        <p:cNvGrpSpPr/>
+        <p:nvPr/>
+      </p:nvGrpSpPr>
+      <p:grpSpPr>
+        <a:xfrm>
+          <a:off x="0" y="0"/>
+          <a:ext cx="0" cy="0"/>
+          <a:chOff x="0" y="0"/>
+          <a:chExt cx="0" cy="0"/>
+        </a:xfrm>
+      </p:grpSpPr>
+      <p:sp>
+        <p:nvSpPr>
+          <p:cNvPr id="2" name="Titre 1">
+            <a:extLst>
+              <a:ext uri="{FF2B5EF4-FFF2-40B4-BE49-F238E27FC236}">
+                <a16:creationId xmlns:a16="http://schemas.microsoft.com/office/drawing/2014/main" id="{FA6243E6-E350-4836-3E9F-D3814475FD2C}"/>
+              </a:ext>
+            </a:extLst>
+          </p:cNvPr>
+          <p:cNvSpPr>
+            <a:spLocks noGrp="1"/>
+          </p:cNvSpPr>
+          <p:nvPr>
+            <p:ph type="title"/>
+          </p:nvPr>
+        </p:nvSpPr>
+        <p:spPr/>
+        <p:txBody>
+          <a:bodyPr/>
+          <a:lstStyle/>
+          <a:p>
+            <a:r>
+              <a:rPr lang="fr-FR" dirty="0"/>
+              <a:t>Jour 9 - Projet</a:t>
             </a:r>
           </a:p>
         </p:txBody>
@@ -12880,7 +13756,7 @@
           <p:cNvPr id="4" name="Espace réservé du texte 3">
             <a:extLst>
               <a:ext uri="{FF2B5EF4-FFF2-40B4-BE49-F238E27FC236}">
-                <a16:creationId xmlns:a16="http://schemas.microsoft.com/office/drawing/2014/main" id="{3D678D7E-8072-8B66-6EB7-C0CECFAF9EAE}"/>
+                <a16:creationId xmlns:a16="http://schemas.microsoft.com/office/drawing/2014/main" id="{24E22D90-D352-DD92-3A88-32EB8E2D63FA}"/>
               </a:ext>
             </a:extLst>
           </p:cNvPr>
@@ -12903,7 +13779,544 @@
     </p:spTree>
     <p:extLst>
       <p:ext uri="{BB962C8B-B14F-4D97-AF65-F5344CB8AC3E}">
+        <p14:creationId xmlns:p14="http://schemas.microsoft.com/office/powerpoint/2010/main" val="80189523"/>
+      </p:ext>
+    </p:extLst>
+  </p:cSld>
+  <p:clrMapOvr>
+    <a:masterClrMapping/>
+  </p:clrMapOvr>
+</p:sld>
+</file>
+
+<file path=ppt/slides/slide36.xml><?xml version="1.0" encoding="utf-8"?>
+<p:sld xmlns:a="http://schemas.openxmlformats.org/drawingml/2006/main" xmlns:r="http://schemas.openxmlformats.org/officeDocument/2006/relationships" xmlns:p="http://schemas.openxmlformats.org/presentationml/2006/main">
+  <p:cSld>
+    <p:spTree>
+      <p:nvGrpSpPr>
+        <p:cNvPr id="1" name=""/>
+        <p:cNvGrpSpPr/>
+        <p:nvPr/>
+      </p:nvGrpSpPr>
+      <p:grpSpPr>
+        <a:xfrm>
+          <a:off x="0" y="0"/>
+          <a:ext cx="0" cy="0"/>
+          <a:chOff x="0" y="0"/>
+          <a:chExt cx="0" cy="0"/>
+        </a:xfrm>
+      </p:grpSpPr>
+      <p:sp>
+        <p:nvSpPr>
+          <p:cNvPr id="2" name="Titre 1">
+            <a:extLst>
+              <a:ext uri="{FF2B5EF4-FFF2-40B4-BE49-F238E27FC236}">
+                <a16:creationId xmlns:a16="http://schemas.microsoft.com/office/drawing/2014/main" id="{43027863-5F12-C0FC-41B6-6A37F08C783C}"/>
+              </a:ext>
+            </a:extLst>
+          </p:cNvPr>
+          <p:cNvSpPr>
+            <a:spLocks noGrp="1"/>
+          </p:cNvSpPr>
+          <p:nvPr>
+            <p:ph type="title"/>
+          </p:nvPr>
+        </p:nvSpPr>
+        <p:spPr/>
+        <p:txBody>
+          <a:bodyPr/>
+          <a:lstStyle/>
+          <a:p>
+            <a:r>
+              <a:rPr lang="fr-FR" dirty="0"/>
+              <a:t>Analyse</a:t>
+            </a:r>
+          </a:p>
+        </p:txBody>
+      </p:sp>
+      <p:sp>
+        <p:nvSpPr>
+          <p:cNvPr id="3" name="Espace réservé du contenu 2">
+            <a:extLst>
+              <a:ext uri="{FF2B5EF4-FFF2-40B4-BE49-F238E27FC236}">
+                <a16:creationId xmlns:a16="http://schemas.microsoft.com/office/drawing/2014/main" id="{7343D8EC-44D1-AF04-E6CC-7986F8B14507}"/>
+              </a:ext>
+            </a:extLst>
+          </p:cNvPr>
+          <p:cNvSpPr>
+            <a:spLocks noGrp="1"/>
+          </p:cNvSpPr>
+          <p:nvPr>
+            <p:ph idx="1"/>
+          </p:nvPr>
+        </p:nvSpPr>
+        <p:spPr/>
+        <p:txBody>
+          <a:bodyPr>
+            <a:normAutofit/>
+          </a:bodyPr>
+          <a:lstStyle/>
+          <a:p>
+            <a:r>
+              <a:rPr lang="fr-FR" dirty="0"/>
+              <a:t>C'est quoi votre </a:t>
+            </a:r>
+            <a:r>
+              <a:rPr lang="fr-FR" dirty="0" err="1"/>
+              <a:t>target</a:t>
+            </a:r>
+            <a:r>
+              <a:rPr lang="fr-FR" dirty="0"/>
+              <a:t> ?</a:t>
+            </a:r>
+          </a:p>
+          <a:p>
+            <a:pPr lvl="1"/>
+            <a:r>
+              <a:rPr lang="fr-FR" dirty="0"/>
+              <a:t>Donc les autres ce sont les </a:t>
+            </a:r>
+            <a:r>
+              <a:rPr lang="fr-FR" dirty="0" err="1"/>
+              <a:t>features</a:t>
+            </a:r>
+            <a:endParaRPr lang="fr-FR" dirty="0"/>
+          </a:p>
+          <a:p>
+            <a:r>
+              <a:rPr lang="fr-FR" dirty="0"/>
+              <a:t>C'est de la régression ou du classement?</a:t>
+            </a:r>
+          </a:p>
+          <a:p>
+            <a:r>
+              <a:rPr lang="fr-FR" dirty="0"/>
+              <a:t>Passez du temps sur l'EDA</a:t>
+            </a:r>
+          </a:p>
+          <a:p>
+            <a:pPr lvl="1"/>
+            <a:r>
+              <a:rPr lang="fr-FR" dirty="0"/>
+              <a:t>Revoyez l'exemple Titanic</a:t>
+            </a:r>
+          </a:p>
+          <a:p>
+            <a:pPr lvl="1"/>
+            <a:r>
+              <a:rPr lang="fr-FR" dirty="0"/>
+              <a:t>Affichez la </a:t>
+            </a:r>
+            <a:r>
+              <a:rPr lang="fr-FR" dirty="0" err="1"/>
+              <a:t>target</a:t>
+            </a:r>
+            <a:r>
+              <a:rPr lang="fr-FR" dirty="0"/>
+              <a:t> en fonction de tout, appropriez-vous les données</a:t>
+            </a:r>
+          </a:p>
+          <a:p>
+            <a:r>
+              <a:rPr lang="fr-FR" dirty="0"/>
+              <a:t>Analysez, critiquez les scores</a:t>
+            </a:r>
+          </a:p>
+          <a:p>
+            <a:r>
+              <a:rPr lang="fr-FR" dirty="0"/>
+              <a:t>Y a-t-il d'autres modèles, en plus de ceux vus en cours, à tester ?</a:t>
+            </a:r>
+          </a:p>
+          <a:p>
+            <a:r>
+              <a:rPr lang="fr-FR" dirty="0"/>
+              <a:t>Y a-t-il des </a:t>
+            </a:r>
+            <a:r>
+              <a:rPr lang="fr-FR" dirty="0" err="1"/>
+              <a:t>scorings</a:t>
+            </a:r>
+            <a:r>
+              <a:rPr lang="fr-FR" dirty="0"/>
+              <a:t>, pas vu en cours, utilisables ?</a:t>
+            </a:r>
+          </a:p>
+          <a:p>
+            <a:endParaRPr lang="fr-FR" dirty="0"/>
+          </a:p>
+        </p:txBody>
+      </p:sp>
+    </p:spTree>
+    <p:extLst>
+      <p:ext uri="{BB962C8B-B14F-4D97-AF65-F5344CB8AC3E}">
+        <p14:creationId xmlns:p14="http://schemas.microsoft.com/office/powerpoint/2010/main" val="2196644587"/>
+      </p:ext>
+    </p:extLst>
+  </p:cSld>
+  <p:clrMapOvr>
+    <a:masterClrMapping/>
+  </p:clrMapOvr>
+</p:sld>
+</file>
+
+<file path=ppt/slides/slide37.xml><?xml version="1.0" encoding="utf-8"?>
+<p:sld xmlns:a="http://schemas.openxmlformats.org/drawingml/2006/main" xmlns:r="http://schemas.openxmlformats.org/officeDocument/2006/relationships" xmlns:p="http://schemas.openxmlformats.org/presentationml/2006/main">
+  <p:cSld>
+    <p:spTree>
+      <p:nvGrpSpPr>
+        <p:cNvPr id="1" name=""/>
+        <p:cNvGrpSpPr/>
+        <p:nvPr/>
+      </p:nvGrpSpPr>
+      <p:grpSpPr>
+        <a:xfrm>
+          <a:off x="0" y="0"/>
+          <a:ext cx="0" cy="0"/>
+          <a:chOff x="0" y="0"/>
+          <a:chExt cx="0" cy="0"/>
+        </a:xfrm>
+      </p:grpSpPr>
+      <p:sp>
+        <p:nvSpPr>
+          <p:cNvPr id="2" name="Titre 1">
+            <a:extLst>
+              <a:ext uri="{FF2B5EF4-FFF2-40B4-BE49-F238E27FC236}">
+                <a16:creationId xmlns:a16="http://schemas.microsoft.com/office/drawing/2014/main" id="{FA6243E6-E350-4836-3E9F-D3814475FD2C}"/>
+              </a:ext>
+            </a:extLst>
+          </p:cNvPr>
+          <p:cNvSpPr>
+            <a:spLocks noGrp="1"/>
+          </p:cNvSpPr>
+          <p:nvPr>
+            <p:ph type="title"/>
+          </p:nvPr>
+        </p:nvSpPr>
+        <p:spPr/>
+        <p:txBody>
+          <a:bodyPr/>
+          <a:lstStyle/>
+          <a:p>
+            <a:r>
+              <a:rPr lang="fr-FR"/>
+              <a:t>Jour 10 </a:t>
+            </a:r>
+            <a:r>
+              <a:rPr lang="fr-FR" dirty="0"/>
+              <a:t>- Présentations</a:t>
+            </a:r>
+          </a:p>
+        </p:txBody>
+      </p:sp>
+      <p:sp>
+        <p:nvSpPr>
+          <p:cNvPr id="4" name="Espace réservé du texte 3">
+            <a:extLst>
+              <a:ext uri="{FF2B5EF4-FFF2-40B4-BE49-F238E27FC236}">
+                <a16:creationId xmlns:a16="http://schemas.microsoft.com/office/drawing/2014/main" id="{3D678D7E-8072-8B66-6EB7-C0CECFAF9EAE}"/>
+              </a:ext>
+            </a:extLst>
+          </p:cNvPr>
+          <p:cNvSpPr>
+            <a:spLocks noGrp="1"/>
+          </p:cNvSpPr>
+          <p:nvPr>
+            <p:ph type="body" idx="1"/>
+          </p:nvPr>
+        </p:nvSpPr>
+        <p:spPr/>
+        <p:txBody>
+          <a:bodyPr/>
+          <a:lstStyle/>
+          <a:p>
+            <a:endParaRPr lang="fr-FR"/>
+          </a:p>
+        </p:txBody>
+      </p:sp>
+    </p:spTree>
+    <p:extLst>
+      <p:ext uri="{BB962C8B-B14F-4D97-AF65-F5344CB8AC3E}">
         <p14:creationId xmlns:p14="http://schemas.microsoft.com/office/powerpoint/2010/main" val="1230004352"/>
+      </p:ext>
+    </p:extLst>
+  </p:cSld>
+  <p:clrMapOvr>
+    <a:masterClrMapping/>
+  </p:clrMapOvr>
+</p:sld>
+</file>
+
+<file path=ppt/slides/slide38.xml><?xml version="1.0" encoding="utf-8"?>
+<p:sld xmlns:a="http://schemas.openxmlformats.org/drawingml/2006/main" xmlns:r="http://schemas.openxmlformats.org/officeDocument/2006/relationships" xmlns:p="http://schemas.openxmlformats.org/presentationml/2006/main">
+  <p:cSld>
+    <p:spTree>
+      <p:nvGrpSpPr>
+        <p:cNvPr id="1" name=""/>
+        <p:cNvGrpSpPr/>
+        <p:nvPr/>
+      </p:nvGrpSpPr>
+      <p:grpSpPr>
+        <a:xfrm>
+          <a:off x="0" y="0"/>
+          <a:ext cx="0" cy="0"/>
+          <a:chOff x="0" y="0"/>
+          <a:chExt cx="0" cy="0"/>
+        </a:xfrm>
+      </p:grpSpPr>
+      <p:sp>
+        <p:nvSpPr>
+          <p:cNvPr id="2" name="Titre 1">
+            <a:extLst>
+              <a:ext uri="{FF2B5EF4-FFF2-40B4-BE49-F238E27FC236}">
+                <a16:creationId xmlns:a16="http://schemas.microsoft.com/office/drawing/2014/main" id="{370F5FAD-9F53-AAE9-AB90-BF22980F842C}"/>
+              </a:ext>
+            </a:extLst>
+          </p:cNvPr>
+          <p:cNvSpPr>
+            <a:spLocks noGrp="1"/>
+          </p:cNvSpPr>
+          <p:nvPr>
+            <p:ph type="title"/>
+          </p:nvPr>
+        </p:nvSpPr>
+        <p:spPr/>
+        <p:txBody>
+          <a:bodyPr/>
+          <a:lstStyle/>
+          <a:p>
+            <a:r>
+              <a:rPr lang="fr-FR" dirty="0"/>
+              <a:t>Présentation</a:t>
+            </a:r>
+          </a:p>
+        </p:txBody>
+      </p:sp>
+      <p:sp>
+        <p:nvSpPr>
+          <p:cNvPr id="3" name="Espace réservé du contenu 2">
+            <a:extLst>
+              <a:ext uri="{FF2B5EF4-FFF2-40B4-BE49-F238E27FC236}">
+                <a16:creationId xmlns:a16="http://schemas.microsoft.com/office/drawing/2014/main" id="{913331AE-0180-6BC1-67DA-C0635E1BC504}"/>
+              </a:ext>
+            </a:extLst>
+          </p:cNvPr>
+          <p:cNvSpPr>
+            <a:spLocks noGrp="1"/>
+          </p:cNvSpPr>
+          <p:nvPr>
+            <p:ph idx="1"/>
+          </p:nvPr>
+        </p:nvSpPr>
+        <p:spPr>
+          <a:xfrm>
+            <a:off x="838200" y="1825625"/>
+            <a:ext cx="10595708" cy="4351338"/>
+          </a:xfrm>
+        </p:spPr>
+        <p:txBody>
+          <a:bodyPr>
+            <a:normAutofit/>
+          </a:bodyPr>
+          <a:lstStyle/>
+          <a:p>
+            <a:r>
+              <a:rPr lang="fr-FR" dirty="0"/>
+              <a:t>10' + 5' de questions</a:t>
+            </a:r>
+          </a:p>
+          <a:p>
+            <a:r>
+              <a:rPr lang="fr-FR" dirty="0"/>
+              <a:t>=&gt; 5-6 slides</a:t>
+            </a:r>
+          </a:p>
+          <a:p>
+            <a:r>
+              <a:rPr lang="fr-FR" dirty="0"/>
+              <a:t>Pensez au slide qui va rester à l'écran pendant les Q&amp;A</a:t>
+            </a:r>
+          </a:p>
+          <a:p>
+            <a:pPr lvl="1"/>
+            <a:r>
+              <a:rPr lang="fr-FR" dirty="0"/>
+              <a:t>Vous passez quoi comme message ?</a:t>
+            </a:r>
+          </a:p>
+          <a:p>
+            <a:r>
+              <a:rPr lang="fr-FR" dirty="0"/>
+              <a:t>Imaginez que vous présentez à vos parents</a:t>
+            </a:r>
+          </a:p>
+          <a:p>
+            <a:pPr lvl="1"/>
+            <a:r>
+              <a:rPr lang="fr-FR" dirty="0"/>
+              <a:t>Assurez-vous que l'auditoire vous suit</a:t>
+            </a:r>
+          </a:p>
+          <a:p>
+            <a:pPr lvl="1"/>
+            <a:r>
+              <a:rPr lang="fr-FR" dirty="0"/>
+              <a:t>Pas (trop) de technique, des images, des dessins des conclusions simples</a:t>
+            </a:r>
+          </a:p>
+          <a:p>
+            <a:r>
+              <a:rPr lang="fr-FR" dirty="0"/>
+              <a:t>Pas trop de texte (5 phrases max, 5 mots par phrase max)</a:t>
+            </a:r>
+          </a:p>
+        </p:txBody>
+      </p:sp>
+    </p:spTree>
+    <p:extLst>
+      <p:ext uri="{BB962C8B-B14F-4D97-AF65-F5344CB8AC3E}">
+        <p14:creationId xmlns:p14="http://schemas.microsoft.com/office/powerpoint/2010/main" val="670108457"/>
+      </p:ext>
+    </p:extLst>
+  </p:cSld>
+  <p:clrMapOvr>
+    <a:masterClrMapping/>
+  </p:clrMapOvr>
+</p:sld>
+</file>
+
+<file path=ppt/slides/slide39.xml><?xml version="1.0" encoding="utf-8"?>
+<p:sld xmlns:a="http://schemas.openxmlformats.org/drawingml/2006/main" xmlns:r="http://schemas.openxmlformats.org/officeDocument/2006/relationships" xmlns:p="http://schemas.openxmlformats.org/presentationml/2006/main">
+  <p:cSld>
+    <p:spTree>
+      <p:nvGrpSpPr>
+        <p:cNvPr id="1" name=""/>
+        <p:cNvGrpSpPr/>
+        <p:nvPr/>
+      </p:nvGrpSpPr>
+      <p:grpSpPr>
+        <a:xfrm>
+          <a:off x="0" y="0"/>
+          <a:ext cx="0" cy="0"/>
+          <a:chOff x="0" y="0"/>
+          <a:chExt cx="0" cy="0"/>
+        </a:xfrm>
+      </p:grpSpPr>
+      <p:sp>
+        <p:nvSpPr>
+          <p:cNvPr id="2" name="Titre 1">
+            <a:extLst>
+              <a:ext uri="{FF2B5EF4-FFF2-40B4-BE49-F238E27FC236}">
+                <a16:creationId xmlns:a16="http://schemas.microsoft.com/office/drawing/2014/main" id="{6F0D182C-1E5D-ED58-7153-E1A941AD5452}"/>
+              </a:ext>
+            </a:extLst>
+          </p:cNvPr>
+          <p:cNvSpPr>
+            <a:spLocks noGrp="1"/>
+          </p:cNvSpPr>
+          <p:nvPr>
+            <p:ph type="title"/>
+          </p:nvPr>
+        </p:nvSpPr>
+        <p:spPr/>
+        <p:txBody>
+          <a:bodyPr/>
+          <a:lstStyle/>
+          <a:p>
+            <a:r>
+              <a:rPr lang="fr-FR" dirty="0"/>
+              <a:t>Répétitions</a:t>
+            </a:r>
+          </a:p>
+        </p:txBody>
+      </p:sp>
+      <p:sp>
+        <p:nvSpPr>
+          <p:cNvPr id="3" name="Espace réservé du contenu 2">
+            <a:extLst>
+              <a:ext uri="{FF2B5EF4-FFF2-40B4-BE49-F238E27FC236}">
+                <a16:creationId xmlns:a16="http://schemas.microsoft.com/office/drawing/2014/main" id="{C6C930C7-903E-CFFA-C59E-99506DCC3630}"/>
+              </a:ext>
+            </a:extLst>
+          </p:cNvPr>
+          <p:cNvSpPr>
+            <a:spLocks noGrp="1"/>
+          </p:cNvSpPr>
+          <p:nvPr>
+            <p:ph idx="1"/>
+          </p:nvPr>
+        </p:nvSpPr>
+        <p:spPr/>
+        <p:txBody>
+          <a:bodyPr/>
+          <a:lstStyle/>
+          <a:p>
+            <a:r>
+              <a:rPr lang="fr-FR" dirty="0"/>
+              <a:t>La répétition se fait debout devant un écran…</a:t>
+            </a:r>
+          </a:p>
+          <a:p>
+            <a:r>
+              <a:rPr lang="fr-FR" dirty="0"/>
+              <a:t>Chaque membre doit parler</a:t>
+            </a:r>
+          </a:p>
+          <a:p>
+            <a:r>
+              <a:rPr lang="fr-FR" dirty="0"/>
+              <a:t>Soignez l'intro (open gambit) et la conclusion (restez positifs)</a:t>
+            </a:r>
+          </a:p>
+          <a:p>
+            <a:pPr lvl="1"/>
+            <a:r>
+              <a:rPr lang="fr-FR" dirty="0"/>
+              <a:t>Prenez le temps d'exposer le sujet </a:t>
+            </a:r>
+          </a:p>
+          <a:p>
+            <a:pPr lvl="1"/>
+            <a:r>
+              <a:rPr lang="fr-FR" dirty="0"/>
+              <a:t>Vous êtes dessus depuis 2 jours, pas votre auditoire</a:t>
+            </a:r>
+          </a:p>
+          <a:p>
+            <a:r>
+              <a:rPr lang="fr-FR" dirty="0"/>
+              <a:t>Les slides ne sont PAS la présentation </a:t>
+            </a:r>
+          </a:p>
+          <a:p>
+            <a:pPr lvl="1"/>
+            <a:r>
+              <a:rPr lang="fr-FR" dirty="0"/>
+              <a:t>c'est ce que vous dites qui compte</a:t>
+            </a:r>
+          </a:p>
+          <a:p>
+            <a:r>
+              <a:rPr lang="fr-FR" dirty="0"/>
+              <a:t>Si il y a des graphes expliquez les axes, les unités, le contenu</a:t>
+            </a:r>
+          </a:p>
+          <a:p>
+            <a:pPr lvl="1"/>
+            <a:r>
+              <a:rPr lang="fr-FR" dirty="0"/>
+              <a:t>Simplifiez, simplifiez, simplifiez</a:t>
+            </a:r>
+          </a:p>
+          <a:p>
+            <a:endParaRPr lang="fr-FR" dirty="0"/>
+          </a:p>
+        </p:txBody>
+      </p:sp>
+    </p:spTree>
+    <p:extLst>
+      <p:ext uri="{BB962C8B-B14F-4D97-AF65-F5344CB8AC3E}">
+        <p14:creationId xmlns:p14="http://schemas.microsoft.com/office/powerpoint/2010/main" val="3721109662"/>
       </p:ext>
     </p:extLst>
   </p:cSld>
@@ -13328,12 +14741,33 @@
             <p:ph idx="1"/>
           </p:nvPr>
         </p:nvSpPr>
-        <p:spPr/>
+        <p:spPr>
+          <a:xfrm>
+            <a:off x="838200" y="1825625"/>
+            <a:ext cx="3806728" cy="4351338"/>
+          </a:xfrm>
+        </p:spPr>
         <p:txBody>
           <a:bodyPr/>
           <a:lstStyle/>
           <a:p>
-            <a:endParaRPr lang="fr-FR"/>
+            <a:r>
+              <a:rPr lang="fr-FR" dirty="0"/>
+              <a:t>1 répertoire = 1 projet</a:t>
+            </a:r>
+          </a:p>
+          <a:p>
+            <a:r>
+              <a:rPr lang="fr-FR" dirty="0"/>
+              <a:t>Vous gérez les fichiers/répertoires depuis VSCode</a:t>
+            </a:r>
+          </a:p>
+          <a:p>
+            <a:pPr lvl="1"/>
+            <a:r>
+              <a:rPr lang="fr-FR" dirty="0"/>
+              <a:t>Créer, renommer, supprimer, copier…</a:t>
+            </a:r>
           </a:p>
         </p:txBody>
       </p:sp>
@@ -13359,8 +14793,8 @@
         </p:blipFill>
         <p:spPr>
           <a:xfrm>
-            <a:off x="6572923" y="1534735"/>
-            <a:ext cx="4785775" cy="5197290"/>
+            <a:off x="8038866" y="1534735"/>
+            <a:ext cx="3319832" cy="3605295"/>
           </a:xfrm>
           <a:prstGeom prst="rect">
             <a:avLst/>
@@ -13396,8 +14830,8 @@
         </p:blipFill>
         <p:spPr>
           <a:xfrm>
-            <a:off x="838200" y="1534735"/>
-            <a:ext cx="4450466" cy="4503810"/>
+            <a:off x="4720239" y="1534735"/>
+            <a:ext cx="3087232" cy="3124236"/>
           </a:xfrm>
           <a:prstGeom prst="rect">
             <a:avLst/>
@@ -13424,8 +14858,8 @@
           <p:nvPr/>
         </p:nvSpPr>
         <p:spPr>
-          <a:xfrm rot="20281647">
-            <a:off x="1357275" y="5910460"/>
+          <a:xfrm rot="13138593">
+            <a:off x="6898312" y="4803146"/>
             <a:ext cx="1594185" cy="673768"/>
           </a:xfrm>
           <a:prstGeom prst="rightArrow">

</xml_diff>